<commit_message>
added note to include link to tools
</commit_message>
<xml_diff>
--- a/TDD In Action.pptx
+++ b/TDD In Action.pptx
@@ -5,7 +5,7 @@
     <p:sldMasterId id="2147483840" r:id="rId1"/>
   </p:sldMasterIdLst>
   <p:notesMasterIdLst>
-    <p:notesMasterId r:id="rId37"/>
+    <p:notesMasterId r:id="rId38"/>
   </p:notesMasterIdLst>
   <p:sldIdLst>
     <p:sldId id="320" r:id="rId2"/>
@@ -38,11 +38,12 @@
     <p:sldId id="358" r:id="rId29"/>
     <p:sldId id="359" r:id="rId30"/>
     <p:sldId id="396" r:id="rId31"/>
-    <p:sldId id="397" r:id="rId32"/>
-    <p:sldId id="401" r:id="rId33"/>
-    <p:sldId id="398" r:id="rId34"/>
-    <p:sldId id="400" r:id="rId35"/>
-    <p:sldId id="399" r:id="rId36"/>
+    <p:sldId id="402" r:id="rId32"/>
+    <p:sldId id="397" r:id="rId33"/>
+    <p:sldId id="401" r:id="rId34"/>
+    <p:sldId id="398" r:id="rId35"/>
+    <p:sldId id="400" r:id="rId36"/>
+    <p:sldId id="399" r:id="rId37"/>
   </p:sldIdLst>
   <p:sldSz cx="9144000" cy="6858000" type="screen4x3"/>
   <p:notesSz cx="6858000" cy="9144000"/>
@@ -227,7 +228,7 @@
             <a:fld id="{CE22DD2D-CE48-432A-B750-FE638311F72D}" type="datetimeFigureOut">
               <a:rPr lang="en-US" smtClean="0"/>
               <a:pPr/>
-              <a:t>5/13/2010</a:t>
+              <a:t>5/14/2010</a:t>
             </a:fld>
             <a:endParaRPr lang="en-US"/>
           </a:p>
@@ -1698,7 +1699,7 @@
             <a:fld id="{C3F416CD-67A3-4CF0-A210-F6AF31AC147F}" type="datetimeFigureOut">
               <a:rPr lang="en-US" smtClean="0"/>
               <a:pPr/>
-              <a:t>5/13/2010</a:t>
+              <a:t>5/14/2010</a:t>
             </a:fld>
             <a:endParaRPr lang="en-US"/>
           </a:p>
@@ -1878,7 +1879,7 @@
             <a:fld id="{C3F416CD-67A3-4CF0-A210-F6AF31AC147F}" type="datetimeFigureOut">
               <a:rPr lang="en-US" smtClean="0"/>
               <a:pPr/>
-              <a:t>5/13/2010</a:t>
+              <a:t>5/14/2010</a:t>
             </a:fld>
             <a:endParaRPr lang="en-US"/>
           </a:p>
@@ -2055,7 +2056,7 @@
             <a:fld id="{C3F416CD-67A3-4CF0-A210-F6AF31AC147F}" type="datetimeFigureOut">
               <a:rPr lang="en-US" smtClean="0"/>
               <a:pPr/>
-              <a:t>5/13/2010</a:t>
+              <a:t>5/14/2010</a:t>
             </a:fld>
             <a:endParaRPr lang="en-US"/>
           </a:p>
@@ -2222,7 +2223,7 @@
             <a:fld id="{C3F416CD-67A3-4CF0-A210-F6AF31AC147F}" type="datetimeFigureOut">
               <a:rPr lang="en-US" smtClean="0"/>
               <a:pPr/>
-              <a:t>5/13/2010</a:t>
+              <a:t>5/14/2010</a:t>
             </a:fld>
             <a:endParaRPr lang="en-US"/>
           </a:p>
@@ -2435,7 +2436,7 @@
             <a:fld id="{C3F416CD-67A3-4CF0-A210-F6AF31AC147F}" type="datetimeFigureOut">
               <a:rPr lang="en-US" smtClean="0"/>
               <a:pPr/>
-              <a:t>5/13/2010</a:t>
+              <a:t>5/14/2010</a:t>
             </a:fld>
             <a:endParaRPr lang="en-US"/>
           </a:p>
@@ -2720,7 +2721,7 @@
             <a:fld id="{C3F416CD-67A3-4CF0-A210-F6AF31AC147F}" type="datetimeFigureOut">
               <a:rPr lang="en-US" smtClean="0"/>
               <a:pPr/>
-              <a:t>5/13/2010</a:t>
+              <a:t>5/14/2010</a:t>
             </a:fld>
             <a:endParaRPr lang="en-US"/>
           </a:p>
@@ -3152,7 +3153,7 @@
             <a:fld id="{C3F416CD-67A3-4CF0-A210-F6AF31AC147F}" type="datetimeFigureOut">
               <a:rPr lang="en-US" smtClean="0"/>
               <a:pPr algn="l" eaLnBrk="1" latinLnBrk="0" hangingPunct="1"/>
-              <a:t>5/13/2010</a:t>
+              <a:t>5/14/2010</a:t>
             </a:fld>
             <a:endParaRPr lang="en-US"/>
           </a:p>
@@ -3272,7 +3273,7 @@
             <a:fld id="{C3F416CD-67A3-4CF0-A210-F6AF31AC147F}" type="datetimeFigureOut">
               <a:rPr lang="en-US" smtClean="0"/>
               <a:pPr/>
-              <a:t>5/13/2010</a:t>
+              <a:t>5/14/2010</a:t>
             </a:fld>
             <a:endParaRPr lang="en-US"/>
           </a:p>
@@ -3364,7 +3365,7 @@
             <a:fld id="{C3F416CD-67A3-4CF0-A210-F6AF31AC147F}" type="datetimeFigureOut">
               <a:rPr lang="en-US" smtClean="0"/>
               <a:pPr/>
-              <a:t>5/13/2010</a:t>
+              <a:t>5/14/2010</a:t>
             </a:fld>
             <a:endParaRPr lang="en-US"/>
           </a:p>
@@ -3655,7 +3656,7 @@
             <a:fld id="{C3F416CD-67A3-4CF0-A210-F6AF31AC147F}" type="datetimeFigureOut">
               <a:rPr lang="en-US" smtClean="0"/>
               <a:pPr/>
-              <a:t>5/13/2010</a:t>
+              <a:t>5/14/2010</a:t>
             </a:fld>
             <a:endParaRPr lang="en-US"/>
           </a:p>
@@ -3982,7 +3983,7 @@
             <a:fld id="{C3F416CD-67A3-4CF0-A210-F6AF31AC147F}" type="datetimeFigureOut">
               <a:rPr lang="en-US" smtClean="0"/>
               <a:pPr/>
-              <a:t>5/13/2010</a:t>
+              <a:t>5/14/2010</a:t>
             </a:fld>
             <a:endParaRPr lang="en-US"/>
           </a:p>
@@ -4203,7 +4204,7 @@
             <a:fld id="{C3F416CD-67A3-4CF0-A210-F6AF31AC147F}" type="datetimeFigureOut">
               <a:rPr lang="en-US" smtClean="0"/>
               <a:pPr algn="l" eaLnBrk="1" latinLnBrk="0" hangingPunct="1"/>
-              <a:t>5/13/2010</a:t>
+              <a:t>5/14/2010</a:t>
             </a:fld>
             <a:endParaRPr lang="en-US" sz="800" dirty="0">
               <a:solidFill>
@@ -8134,7 +8135,11 @@
           <a:p>
             <a:r>
               <a:rPr lang="en-US" dirty="0" smtClean="0"/>
-              <a:t>Resources – Learning TDD</a:t>
+              <a:t>Resources - </a:t>
+            </a:r>
+            <a:r>
+              <a:rPr lang="en-US" dirty="0" smtClean="0"/>
+              <a:t>Tools</a:t>
             </a:r>
             <a:endParaRPr lang="en-US" dirty="0"/>
           </a:p>
@@ -8150,135 +8155,54 @@
             <p:ph idx="1"/>
           </p:nvPr>
         </p:nvSpPr>
-        <p:spPr>
-          <a:xfrm>
-            <a:off x="457200" y="1600200"/>
-            <a:ext cx="8229600" cy="5105400"/>
-          </a:xfrm>
-        </p:spPr>
-        <p:txBody>
-          <a:bodyPr>
-            <a:normAutofit lnSpcReduction="10000"/>
-          </a:bodyPr>
+        <p:spPr/>
+        <p:txBody>
+          <a:bodyPr/>
           <a:lstStyle/>
           <a:p>
             <a:r>
               <a:rPr lang="en-US" sz="2400" dirty="0" smtClean="0"/>
-              <a:t>Behavior Driven Development</a:t>
-            </a:r>
-          </a:p>
-          <a:p>
-            <a:pPr lvl="1"/>
-            <a:r>
-              <a:rPr lang="en-US" sz="1800" b="1" dirty="0" smtClean="0">
-                <a:hlinkClick r:id="rId2"/>
-              </a:rPr>
-              <a:t>http://www.code-magazine.com/article.aspx?quickid=0805061&amp;page=1</a:t>
-            </a:r>
-            <a:endParaRPr lang="en-US" sz="1800" b="1" dirty="0" smtClean="0"/>
-          </a:p>
-          <a:p>
-            <a:pPr lvl="1"/>
-            <a:endParaRPr lang="en-US" sz="1800" b="1" dirty="0" smtClean="0"/>
+              <a:t>Specs2Tests</a:t>
+            </a:r>
           </a:p>
           <a:p>
             <a:r>
               <a:rPr lang="en-US" sz="2400" dirty="0" smtClean="0"/>
-              <a:t>So How do You Introduce TDD into an Organization or Team?, by Jeremy Miller</a:t>
-            </a:r>
-          </a:p>
-          <a:p>
-            <a:pPr lvl="1"/>
-            <a:r>
-              <a:rPr lang="en-US" sz="1800" b="1" dirty="0" smtClean="0">
-                <a:hlinkClick r:id="rId3"/>
-              </a:rPr>
-              <a:t>http://codebetter.com/blogs/jeremy.miller/archive/2006/06/27/146899.aspx</a:t>
-            </a:r>
-            <a:endParaRPr lang="en-US" sz="1800" b="1" dirty="0" smtClean="0"/>
-          </a:p>
-          <a:p>
-            <a:pPr lvl="1"/>
-            <a:endParaRPr lang="en-US" sz="1800" b="1" dirty="0" smtClean="0"/>
+              <a:t>Should/</a:t>
+            </a:r>
+            <a:r>
+              <a:rPr lang="en-US" sz="2400" dirty="0" err="1" smtClean="0"/>
+              <a:t>Nbehave</a:t>
+            </a:r>
+            <a:endParaRPr lang="en-US" sz="2400" dirty="0" smtClean="0"/>
           </a:p>
           <a:p>
             <a:r>
               <a:rPr lang="en-US" sz="2400" dirty="0" smtClean="0"/>
-              <a:t>How to get started with TDD, by </a:t>
-            </a:r>
+              <a:t>Rhino Mocks</a:t>
+            </a:r>
+          </a:p>
+          <a:p>
+            <a:endParaRPr lang="en-US" sz="2400" dirty="0" smtClean="0"/>
+          </a:p>
+          <a:p>
+            <a:r>
+              <a:rPr lang="en-US" sz="2400" dirty="0" smtClean="0"/>
+              <a:t>Java?</a:t>
+            </a:r>
+          </a:p>
+          <a:p>
+            <a:endParaRPr lang="en-US" sz="2400" dirty="0" smtClean="0"/>
+          </a:p>
+          <a:p>
             <a:r>
               <a:rPr lang="en-US" sz="2400" dirty="0" err="1" smtClean="0"/>
-              <a:t>Misko</a:t>
-            </a:r>
-            <a:r>
-              <a:rPr lang="en-US" sz="2400" dirty="0" smtClean="0"/>
-              <a:t> </a:t>
-            </a:r>
-            <a:r>
-              <a:rPr lang="en-US" sz="2400" dirty="0" err="1" smtClean="0"/>
-              <a:t>Hevery</a:t>
-            </a:r>
-            <a:r>
-              <a:rPr lang="en-US" sz="2400" dirty="0" smtClean="0"/>
-              <a:t> (Java examples)</a:t>
-            </a:r>
-          </a:p>
-          <a:p>
-            <a:pPr lvl="1"/>
-            <a:r>
-              <a:rPr lang="en-US" sz="1800" b="1" dirty="0" smtClean="0">
-                <a:hlinkClick r:id="rId4"/>
-              </a:rPr>
-              <a:t>http://misko.hevery.com/2009/11/17/how-to-get-started-with-tdd/</a:t>
-            </a:r>
-            <a:endParaRPr lang="en-US" sz="2400" dirty="0" smtClean="0"/>
-          </a:p>
-          <a:p>
-            <a:pPr lvl="1"/>
-            <a:endParaRPr lang="en-US" sz="2400" dirty="0" smtClean="0"/>
-          </a:p>
-          <a:p>
-            <a:r>
-              <a:rPr lang="en-US" sz="2400" dirty="0" smtClean="0"/>
-              <a:t>TDD Starter Kit – Sample Projects and Links (C# examples)</a:t>
-            </a:r>
-          </a:p>
-          <a:p>
-            <a:pPr lvl="1"/>
-            <a:r>
-              <a:rPr lang="en-US" sz="1800" dirty="0" smtClean="0">
-                <a:hlinkClick r:id="rId5"/>
-              </a:rPr>
-              <a:t>http://jonkruger.com/blog/2009/07/23/tdd-starter-kit-sample-projects-and-links/</a:t>
-            </a:r>
-            <a:endParaRPr lang="en-US" sz="1800" dirty="0" smtClean="0"/>
-          </a:p>
-          <a:p>
-            <a:pPr lvl="1"/>
-            <a:endParaRPr lang="en-US" sz="1800" dirty="0" smtClean="0"/>
-          </a:p>
-          <a:p>
-            <a:r>
-              <a:rPr lang="en-US" sz="2400" dirty="0" smtClean="0"/>
-              <a:t>Pair Programming </a:t>
-            </a:r>
-            <a:r>
-              <a:rPr lang="en-US" sz="2400" dirty="0" err="1" smtClean="0"/>
-              <a:t>Bot</a:t>
-            </a:r>
-            <a:endParaRPr lang="en-US" sz="2400" dirty="0" smtClean="0"/>
-          </a:p>
-          <a:p>
-            <a:pPr lvl="1"/>
-            <a:r>
-              <a:rPr lang="en-US" sz="1800" dirty="0" smtClean="0">
-                <a:hlinkClick r:id="rId6"/>
-              </a:rPr>
-              <a:t>http://pairprogrammingbot.com/</a:t>
-            </a:r>
-            <a:endParaRPr lang="en-US" sz="1800" dirty="0" smtClean="0"/>
-          </a:p>
-          <a:p>
+              <a:t>Rspec</a:t>
+            </a:r>
+            <a:r>
+              <a:rPr lang="en-US" sz="2400" smtClean="0"/>
+              <a:t>?</a:t>
+            </a:r>
             <a:endParaRPr lang="en-US" dirty="0"/>
           </a:p>
         </p:txBody>
@@ -8334,11 +8258,7 @@
           <a:p>
             <a:r>
               <a:rPr lang="en-US" dirty="0" smtClean="0"/>
-              <a:t>Resources – </a:t>
-            </a:r>
-            <a:r>
-              <a:rPr lang="en-US" dirty="0" smtClean="0"/>
-              <a:t>Books</a:t>
+              <a:t>Resources – Learning TDD</a:t>
             </a:r>
             <a:endParaRPr lang="en-US" dirty="0"/>
           </a:p>
@@ -8362,98 +8282,128 @@
         </p:spPr>
         <p:txBody>
           <a:bodyPr>
-            <a:normAutofit/>
+            <a:normAutofit lnSpcReduction="10000"/>
           </a:bodyPr>
           <a:lstStyle/>
           <a:p>
             <a:r>
-              <a:rPr lang="en-US" dirty="0" smtClean="0"/>
-              <a:t>The Art of Unit Testing</a:t>
+              <a:rPr lang="en-US" sz="2400" dirty="0" smtClean="0"/>
+              <a:t>Behavior Driven Development</a:t>
             </a:r>
           </a:p>
           <a:p>
             <a:pPr lvl="1"/>
             <a:r>
-              <a:rPr lang="en-US" dirty="0" smtClean="0"/>
-              <a:t>by Roy </a:t>
-            </a:r>
-            <a:r>
-              <a:rPr lang="en-US" dirty="0" err="1" smtClean="0"/>
-              <a:t>Osherove</a:t>
-            </a:r>
-            <a:endParaRPr lang="en-US" dirty="0" smtClean="0"/>
-          </a:p>
-          <a:p>
-            <a:r>
-              <a:rPr lang="en-US" dirty="0" smtClean="0"/>
-              <a:t>Test Driven Development: By Example</a:t>
-            </a:r>
+              <a:rPr lang="en-US" sz="1800" b="1" dirty="0" smtClean="0">
+                <a:hlinkClick r:id="rId2"/>
+              </a:rPr>
+              <a:t>http://www.code-magazine.com/article.aspx?quickid=0805061&amp;page=1</a:t>
+            </a:r>
+            <a:endParaRPr lang="en-US" sz="1800" b="1" dirty="0" smtClean="0"/>
           </a:p>
           <a:p>
             <a:pPr lvl="1"/>
-            <a:r>
-              <a:rPr lang="en-US" dirty="0" smtClean="0"/>
-              <a:t>by Kent Beck</a:t>
-            </a:r>
-          </a:p>
-          <a:p>
-            <a:r>
-              <a:rPr lang="en-US" dirty="0" smtClean="0"/>
-              <a:t>Test Driven Development: A Practical Guide</a:t>
+            <a:endParaRPr lang="en-US" sz="1800" b="1" dirty="0" smtClean="0"/>
+          </a:p>
+          <a:p>
+            <a:r>
+              <a:rPr lang="en-US" sz="2400" dirty="0" smtClean="0"/>
+              <a:t>So How do You Introduce TDD into an Organization or Team?, by Jeremy Miller</a:t>
             </a:r>
           </a:p>
           <a:p>
             <a:pPr lvl="1"/>
             <a:r>
-              <a:rPr lang="en-US" dirty="0" smtClean="0"/>
-              <a:t>by David </a:t>
-            </a:r>
-            <a:r>
-              <a:rPr lang="en-US" dirty="0" err="1" smtClean="0"/>
-              <a:t>Astels</a:t>
-            </a:r>
-            <a:endParaRPr lang="en-US" dirty="0" smtClean="0"/>
-          </a:p>
-          <a:p>
-            <a:r>
-              <a:rPr lang="en-US" dirty="0" smtClean="0"/>
-              <a:t>The RSpec Book: </a:t>
-            </a:r>
-            <a:r>
-              <a:rPr lang="en-US" dirty="0" err="1" smtClean="0"/>
-              <a:t>Behaviour</a:t>
-            </a:r>
-            <a:r>
-              <a:rPr lang="en-US" dirty="0" smtClean="0"/>
-              <a:t> Driven Development with RSpec, Cucumber, and Friends</a:t>
-            </a:r>
+              <a:rPr lang="en-US" sz="1800" b="1" dirty="0" smtClean="0">
+                <a:hlinkClick r:id="rId3"/>
+              </a:rPr>
+              <a:t>http://codebetter.com/blogs/jeremy.miller/archive/2006/06/27/146899.aspx</a:t>
+            </a:r>
+            <a:endParaRPr lang="en-US" sz="1800" b="1" dirty="0" smtClean="0"/>
           </a:p>
           <a:p>
             <a:pPr lvl="1"/>
-            <a:r>
-              <a:rPr lang="en-US" dirty="0" smtClean="0"/>
-              <a:t>by </a:t>
-            </a:r>
-            <a:r>
-              <a:rPr lang="en-US" dirty="0" smtClean="0"/>
-              <a:t>David </a:t>
-            </a:r>
-            <a:r>
-              <a:rPr lang="en-US" dirty="0" err="1" smtClean="0"/>
-              <a:t>Chelimsky</a:t>
-            </a:r>
-            <a:r>
-              <a:rPr lang="en-US" dirty="0" smtClean="0"/>
-              <a:t>, Dave </a:t>
-            </a:r>
-            <a:r>
-              <a:rPr lang="en-US" dirty="0" err="1" smtClean="0"/>
-              <a:t>Astels</a:t>
-            </a:r>
-            <a:r>
-              <a:rPr lang="en-US" dirty="0" smtClean="0"/>
-              <a:t>, et. al.</a:t>
-            </a:r>
+            <a:endParaRPr lang="en-US" sz="1800" b="1" dirty="0" smtClean="0"/>
+          </a:p>
+          <a:p>
+            <a:r>
+              <a:rPr lang="en-US" sz="2400" dirty="0" smtClean="0"/>
+              <a:t>How to get started with TDD, by </a:t>
+            </a:r>
+            <a:r>
+              <a:rPr lang="en-US" sz="2400" dirty="0" err="1" smtClean="0"/>
+              <a:t>Misko</a:t>
+            </a:r>
+            <a:r>
+              <a:rPr lang="en-US" sz="2400" dirty="0" smtClean="0"/>
+              <a:t> </a:t>
+            </a:r>
+            <a:r>
+              <a:rPr lang="en-US" sz="2400" dirty="0" err="1" smtClean="0"/>
+              <a:t>Hevery</a:t>
+            </a:r>
+            <a:r>
+              <a:rPr lang="en-US" sz="2400" dirty="0" smtClean="0"/>
+              <a:t> (Java examples)</a:t>
+            </a:r>
+          </a:p>
+          <a:p>
+            <a:pPr lvl="1"/>
+            <a:r>
+              <a:rPr lang="en-US" sz="1800" b="1" dirty="0" smtClean="0">
+                <a:hlinkClick r:id="rId4"/>
+              </a:rPr>
+              <a:t>http://misko.hevery.com/2009/11/17/how-to-get-started-with-tdd/</a:t>
+            </a:r>
+            <a:endParaRPr lang="en-US" sz="2400" dirty="0" smtClean="0"/>
+          </a:p>
+          <a:p>
+            <a:pPr lvl="1"/>
+            <a:endParaRPr lang="en-US" sz="2400" dirty="0" smtClean="0"/>
+          </a:p>
+          <a:p>
+            <a:r>
+              <a:rPr lang="en-US" sz="2400" dirty="0" smtClean="0"/>
+              <a:t>TDD Starter Kit – Sample Projects and Links (C# examples)</a:t>
+            </a:r>
+          </a:p>
+          <a:p>
+            <a:pPr lvl="1"/>
+            <a:r>
+              <a:rPr lang="en-US" sz="1800" dirty="0" smtClean="0">
+                <a:hlinkClick r:id="rId5"/>
+              </a:rPr>
+              <a:t>http://jonkruger.com/blog/2009/07/23/tdd-starter-kit-sample-projects-and-links/</a:t>
+            </a:r>
+            <a:endParaRPr lang="en-US" sz="1800" dirty="0" smtClean="0"/>
+          </a:p>
+          <a:p>
+            <a:pPr lvl="1"/>
+            <a:endParaRPr lang="en-US" sz="1800" dirty="0" smtClean="0"/>
+          </a:p>
+          <a:p>
+            <a:r>
+              <a:rPr lang="en-US" sz="2400" dirty="0" smtClean="0"/>
+              <a:t>Pair Programming </a:t>
+            </a:r>
+            <a:r>
+              <a:rPr lang="en-US" sz="2400" dirty="0" err="1" smtClean="0"/>
+              <a:t>Bot</a:t>
+            </a:r>
+            <a:endParaRPr lang="en-US" sz="2400" dirty="0" smtClean="0"/>
+          </a:p>
+          <a:p>
+            <a:pPr lvl="1"/>
+            <a:r>
+              <a:rPr lang="en-US" sz="1800" dirty="0" smtClean="0">
+                <a:hlinkClick r:id="rId6"/>
+              </a:rPr>
+              <a:t>http://pairprogrammingbot.com/</a:t>
+            </a:r>
+            <a:endParaRPr lang="en-US" sz="1800" dirty="0" smtClean="0"/>
+          </a:p>
+          <a:p>
+            <a:endParaRPr lang="en-US" dirty="0"/>
           </a:p>
         </p:txBody>
       </p:sp>
@@ -8508,7 +8458,7 @@
           <a:p>
             <a:r>
               <a:rPr lang="en-US" dirty="0" smtClean="0"/>
-              <a:t>Resources – Practice!</a:t>
+              <a:t>Resources – Books</a:t>
             </a:r>
             <a:endParaRPr lang="en-US" dirty="0"/>
           </a:p>
@@ -8527,168 +8477,99 @@
         <p:spPr>
           <a:xfrm>
             <a:off x="457200" y="1600200"/>
-            <a:ext cx="8229600" cy="5257800"/>
+            <a:ext cx="8229600" cy="5105400"/>
           </a:xfrm>
         </p:spPr>
         <p:txBody>
           <a:bodyPr>
-            <a:normAutofit lnSpcReduction="10000"/>
+            <a:normAutofit/>
           </a:bodyPr>
           <a:lstStyle/>
           <a:p>
             <a:r>
               <a:rPr lang="en-US" dirty="0" smtClean="0"/>
-              <a:t>String Calculator </a:t>
+              <a:t>The Art of Unit Testing</a:t>
+            </a:r>
+          </a:p>
+          <a:p>
+            <a:pPr lvl="1"/>
+            <a:r>
+              <a:rPr lang="en-US" dirty="0" smtClean="0"/>
+              <a:t>by Roy </a:t>
             </a:r>
             <a:r>
               <a:rPr lang="en-US" dirty="0" err="1" smtClean="0"/>
-              <a:t>kata</a:t>
+              <a:t>Osherove</a:t>
             </a:r>
             <a:endParaRPr lang="en-US" dirty="0" smtClean="0"/>
           </a:p>
           <a:p>
+            <a:r>
+              <a:rPr lang="en-US" dirty="0" smtClean="0"/>
+              <a:t>Test Driven Development: By Example</a:t>
+            </a:r>
+          </a:p>
+          <a:p>
             <a:pPr lvl="1"/>
             <a:r>
-              <a:rPr lang="en-US" dirty="0" smtClean="0">
-                <a:hlinkClick r:id="rId2"/>
-              </a:rPr>
-              <a:t>http://osherove.com/tdd-kata-1/</a:t>
+              <a:rPr lang="en-US" dirty="0" smtClean="0"/>
+              <a:t>by Kent Beck</a:t>
+            </a:r>
+          </a:p>
+          <a:p>
+            <a:r>
+              <a:rPr lang="en-US" dirty="0" smtClean="0"/>
+              <a:t>Test Driven Development: A Practical Guide</a:t>
+            </a:r>
+          </a:p>
+          <a:p>
+            <a:pPr lvl="1"/>
+            <a:r>
+              <a:rPr lang="en-US" dirty="0" smtClean="0"/>
+              <a:t>by David </a:t>
+            </a:r>
+            <a:r>
+              <a:rPr lang="en-US" dirty="0" err="1" smtClean="0"/>
+              <a:t>Astels</a:t>
             </a:r>
             <a:endParaRPr lang="en-US" dirty="0" smtClean="0"/>
           </a:p>
           <a:p>
+            <a:r>
+              <a:rPr lang="en-US" dirty="0" smtClean="0"/>
+              <a:t>The RSpec Book: </a:t>
+            </a:r>
+            <a:r>
+              <a:rPr lang="en-US" dirty="0" err="1" smtClean="0"/>
+              <a:t>Behaviour</a:t>
+            </a:r>
+            <a:r>
+              <a:rPr lang="en-US" dirty="0" smtClean="0"/>
+              <a:t> Driven Development with RSpec, Cucumber, and Friends</a:t>
+            </a:r>
+          </a:p>
+          <a:p>
             <a:pPr lvl="1"/>
-            <a:endParaRPr lang="en-US" dirty="0" smtClean="0"/>
-          </a:p>
-          <a:p>
             <a:r>
               <a:rPr lang="en-US" dirty="0" smtClean="0"/>
-              <a:t>Bowling Game </a:t>
+              <a:t>by David </a:t>
             </a:r>
             <a:r>
               <a:rPr lang="en-US" dirty="0" err="1" smtClean="0"/>
-              <a:t>kata</a:t>
-            </a:r>
-            <a:endParaRPr lang="en-US" dirty="0" smtClean="0"/>
-          </a:p>
-          <a:p>
-            <a:pPr lvl="1"/>
-            <a:r>
-              <a:rPr lang="en-US" sz="2100" dirty="0" smtClean="0">
-                <a:hlinkClick r:id="rId3"/>
-              </a:rPr>
-              <a:t>http://butunclebob.com/ArticleS.UncleBob.TheBowlingGameKata</a:t>
-            </a:r>
-            <a:endParaRPr lang="en-US" sz="2100" dirty="0" smtClean="0"/>
-          </a:p>
-          <a:p>
-            <a:pPr lvl="1"/>
-            <a:endParaRPr lang="en-US" sz="2100" dirty="0" smtClean="0"/>
-          </a:p>
-          <a:p>
-            <a:r>
-              <a:rPr lang="en-US" sz="2700" dirty="0" smtClean="0"/>
-              <a:t>Prime Factors </a:t>
-            </a:r>
-            <a:r>
-              <a:rPr lang="en-US" sz="2700" dirty="0" err="1" smtClean="0"/>
-              <a:t>kata</a:t>
-            </a:r>
-            <a:endParaRPr lang="en-US" sz="2700" dirty="0" smtClean="0"/>
-          </a:p>
-          <a:p>
-            <a:pPr lvl="1"/>
-            <a:r>
-              <a:rPr lang="en-US" sz="1900" dirty="0" smtClean="0">
-                <a:hlinkClick r:id="rId4"/>
-              </a:rPr>
-              <a:t>http://</a:t>
-            </a:r>
-            <a:r>
-              <a:rPr lang="en-US" sz="1900" dirty="0" smtClean="0">
-                <a:hlinkClick r:id="rId4"/>
-              </a:rPr>
-              <a:t>www.butunclebob.com/ArticleS.UncleBob.ThePrimeFactorsKata</a:t>
-            </a:r>
-            <a:endParaRPr lang="en-US" sz="1900" dirty="0" smtClean="0"/>
-          </a:p>
-          <a:p>
-            <a:pPr lvl="1"/>
-            <a:endParaRPr lang="en-US" sz="1900" dirty="0" smtClean="0"/>
-          </a:p>
-          <a:p>
-            <a:r>
-              <a:rPr lang="en-US" sz="2500" dirty="0" smtClean="0"/>
-              <a:t>Greed game (part of the Ruby </a:t>
-            </a:r>
-            <a:r>
-              <a:rPr lang="en-US" sz="2500" dirty="0" err="1" smtClean="0"/>
-              <a:t>koans</a:t>
-            </a:r>
-            <a:r>
-              <a:rPr lang="en-US" sz="2500" dirty="0" smtClean="0"/>
-              <a:t>)</a:t>
-            </a:r>
-          </a:p>
-          <a:p>
-            <a:pPr lvl="1"/>
-            <a:r>
-              <a:rPr lang="en-US" dirty="0" smtClean="0">
-                <a:hlinkClick r:id="rId5"/>
-              </a:rPr>
-              <a:t>http://github.com/edgecase/ruby_koans</a:t>
-            </a:r>
-            <a:endParaRPr lang="en-US" dirty="0" smtClean="0"/>
-          </a:p>
-          <a:p>
-            <a:pPr lvl="1"/>
-            <a:endParaRPr lang="en-US" sz="1900" dirty="0" smtClean="0"/>
-          </a:p>
-          <a:p>
-            <a:r>
-              <a:rPr lang="en-US" sz="2500" dirty="0" err="1" smtClean="0"/>
-              <a:t>Katacasts</a:t>
-            </a:r>
-            <a:r>
-              <a:rPr lang="en-US" sz="2500" dirty="0"/>
-              <a:t> </a:t>
-            </a:r>
-            <a:r>
-              <a:rPr lang="en-US" sz="2500" dirty="0" smtClean="0"/>
-              <a:t>(watch </a:t>
-            </a:r>
-            <a:r>
-              <a:rPr lang="en-US" sz="2500" dirty="0" err="1" smtClean="0"/>
-              <a:t>screencasts</a:t>
-            </a:r>
-            <a:r>
-              <a:rPr lang="en-US" sz="2500" dirty="0" smtClean="0"/>
-              <a:t> of people doing various </a:t>
-            </a:r>
-            <a:r>
-              <a:rPr lang="en-US" sz="2500" dirty="0" err="1" smtClean="0"/>
-              <a:t>katas</a:t>
-            </a:r>
-            <a:r>
-              <a:rPr lang="en-US" sz="2500" dirty="0" smtClean="0"/>
-              <a:t>)</a:t>
-            </a:r>
-          </a:p>
-          <a:p>
-            <a:pPr lvl="1"/>
-            <a:r>
-              <a:rPr lang="en-US" dirty="0" smtClean="0">
-                <a:hlinkClick r:id="rId6"/>
-              </a:rPr>
-              <a:t>http://www.katacasts.com/</a:t>
-            </a:r>
-            <a:endParaRPr lang="en-US" dirty="0" smtClean="0"/>
-          </a:p>
-          <a:p>
-            <a:pPr lvl="1">
-              <a:buNone/>
-            </a:pPr>
-            <a:endParaRPr lang="en-US" sz="1900" dirty="0" smtClean="0"/>
+              <a:t>Chelimsky</a:t>
+            </a:r>
+            <a:r>
+              <a:rPr lang="en-US" dirty="0" smtClean="0"/>
+              <a:t>, Dave </a:t>
+            </a:r>
+            <a:r>
+              <a:rPr lang="en-US" dirty="0" err="1" smtClean="0"/>
+              <a:t>Astels</a:t>
+            </a:r>
+            <a:r>
+              <a:rPr lang="en-US" dirty="0" smtClean="0"/>
+              <a:t>, et. al.</a:t>
+            </a:r>
           </a:p>
         </p:txBody>
       </p:sp>
@@ -8743,11 +8624,7 @@
           <a:p>
             <a:r>
               <a:rPr lang="en-US" dirty="0" smtClean="0"/>
-              <a:t>Resources – </a:t>
-            </a:r>
-            <a:r>
-              <a:rPr lang="en-US" dirty="0" smtClean="0"/>
-              <a:t>Training</a:t>
+              <a:t>Resources – Practice!</a:t>
             </a:r>
             <a:endParaRPr lang="en-US" dirty="0"/>
           </a:p>
@@ -8766,115 +8643,162 @@
         <p:spPr>
           <a:xfrm>
             <a:off x="457200" y="1600200"/>
-            <a:ext cx="8229600" cy="4953000"/>
+            <a:ext cx="8229600" cy="5257800"/>
           </a:xfrm>
         </p:spPr>
         <p:txBody>
           <a:bodyPr>
-            <a:normAutofit/>
+            <a:normAutofit lnSpcReduction="10000"/>
           </a:bodyPr>
           <a:lstStyle/>
           <a:p>
             <a:r>
               <a:rPr lang="en-US" dirty="0" smtClean="0"/>
-              <a:t>TDD Boot Camp (.NET)</a:t>
-            </a:r>
+              <a:t>String Calculator </a:t>
+            </a:r>
+            <a:r>
+              <a:rPr lang="en-US" dirty="0" err="1" smtClean="0"/>
+              <a:t>kata</a:t>
+            </a:r>
+            <a:endParaRPr lang="en-US" dirty="0" smtClean="0"/>
           </a:p>
           <a:p>
             <a:pPr lvl="1"/>
             <a:r>
-              <a:rPr lang="en-US" sz="2800" dirty="0" smtClean="0">
+              <a:rPr lang="en-US" dirty="0" smtClean="0">
                 <a:hlinkClick r:id="rId2"/>
               </a:rPr>
-              <a:t>http://tddbootcamp.com</a:t>
-            </a:r>
-            <a:endParaRPr lang="en-US" sz="2800" dirty="0" smtClean="0"/>
+              <a:t>http://osherove.com/tdd-kata-1/</a:t>
+            </a:r>
+            <a:endParaRPr lang="en-US" dirty="0" smtClean="0"/>
           </a:p>
           <a:p>
             <a:pPr lvl="1"/>
-            <a:r>
-              <a:rPr lang="en-US" sz="2800" dirty="0" smtClean="0"/>
-              <a:t>Cincinnati – June 22-24</a:t>
-            </a:r>
+            <a:endParaRPr lang="en-US" dirty="0" smtClean="0"/>
+          </a:p>
+          <a:p>
+            <a:r>
+              <a:rPr lang="en-US" dirty="0" smtClean="0"/>
+              <a:t>Bowling Game </a:t>
+            </a:r>
+            <a:r>
+              <a:rPr lang="en-US" dirty="0" err="1" smtClean="0"/>
+              <a:t>kata</a:t>
+            </a:r>
+            <a:endParaRPr lang="en-US" dirty="0" smtClean="0"/>
           </a:p>
           <a:p>
             <a:pPr lvl="1"/>
             <a:r>
-              <a:rPr lang="en-US" sz="2800" dirty="0" smtClean="0"/>
-              <a:t>Columbus – July 13-15</a:t>
-            </a:r>
-          </a:p>
-          <a:p>
-            <a:pPr lvl="1"/>
-            <a:r>
-              <a:rPr lang="en-US" sz="2800" dirty="0" smtClean="0"/>
-              <a:t>Detroit – Aug. 18-20</a:t>
-            </a:r>
-            <a:br>
-              <a:rPr lang="en-US" sz="2800" dirty="0" smtClean="0"/>
-            </a:br>
-            <a:endParaRPr lang="en-US" sz="2800" dirty="0" smtClean="0"/>
-          </a:p>
-          <a:p>
-            <a:r>
-              <a:rPr lang="en-US" dirty="0" smtClean="0"/>
-              <a:t>Pillar Technology (Java)</a:t>
-            </a:r>
-          </a:p>
-          <a:p>
-            <a:pPr lvl="1"/>
-            <a:r>
-              <a:rPr lang="en-US" sz="2800" dirty="0" smtClean="0">
+              <a:rPr lang="en-US" sz="2100" dirty="0" smtClean="0">
                 <a:hlinkClick r:id="rId3"/>
               </a:rPr>
-              <a:t>http://pillartechnology.com</a:t>
-            </a:r>
-            <a:r>
-              <a:rPr lang="en-US" sz="2800" dirty="0" smtClean="0"/>
-              <a:t/>
-            </a:r>
-            <a:br>
-              <a:rPr lang="en-US" sz="2800" dirty="0" smtClean="0"/>
-            </a:br>
-            <a:endParaRPr lang="en-US" sz="2800" dirty="0" smtClean="0"/>
-          </a:p>
-          <a:p>
-            <a:r>
-              <a:rPr lang="en-US" dirty="0" err="1" smtClean="0"/>
-              <a:t>EdgeCase</a:t>
-            </a:r>
-            <a:r>
-              <a:rPr lang="en-US" dirty="0" smtClean="0"/>
-              <a:t> (Ruby on Rails)</a:t>
-            </a:r>
+              <a:t>http://butunclebob.com/ArticleS.UncleBob.TheBowlingGameKata</a:t>
+            </a:r>
+            <a:endParaRPr lang="en-US" sz="2100" dirty="0" smtClean="0"/>
           </a:p>
           <a:p>
             <a:pPr lvl="1"/>
-            <a:r>
-              <a:rPr lang="en-US" sz="2800" dirty="0" smtClean="0">
+            <a:endParaRPr lang="en-US" sz="2100" dirty="0" smtClean="0"/>
+          </a:p>
+          <a:p>
+            <a:r>
+              <a:rPr lang="en-US" sz="2700" dirty="0" smtClean="0"/>
+              <a:t>Prime Factors </a:t>
+            </a:r>
+            <a:r>
+              <a:rPr lang="en-US" sz="2700" dirty="0" err="1" smtClean="0"/>
+              <a:t>kata</a:t>
+            </a:r>
+            <a:endParaRPr lang="en-US" sz="2700" dirty="0" smtClean="0"/>
+          </a:p>
+          <a:p>
+            <a:pPr lvl="1"/>
+            <a:r>
+              <a:rPr lang="en-US" sz="1900" dirty="0" smtClean="0">
                 <a:hlinkClick r:id="rId4"/>
               </a:rPr>
-              <a:t>http://edgecase.com</a:t>
-            </a:r>
-            <a:endParaRPr lang="en-US" sz="2800" dirty="0" smtClean="0"/>
+              <a:t>http://www.butunclebob.com/ArticleS.UncleBob.ThePrimeFactorsKata</a:t>
+            </a:r>
+            <a:endParaRPr lang="en-US" sz="1900" dirty="0" smtClean="0"/>
+          </a:p>
+          <a:p>
+            <a:pPr lvl="1"/>
+            <a:endParaRPr lang="en-US" sz="1900" dirty="0" smtClean="0"/>
+          </a:p>
+          <a:p>
+            <a:r>
+              <a:rPr lang="en-US" sz="2500" dirty="0" smtClean="0"/>
+              <a:t>Greed game (part of the Ruby </a:t>
+            </a:r>
+            <a:r>
+              <a:rPr lang="en-US" sz="2500" dirty="0" err="1" smtClean="0"/>
+              <a:t>koans</a:t>
+            </a:r>
+            <a:r>
+              <a:rPr lang="en-US" sz="2500" dirty="0" smtClean="0"/>
+              <a:t>)</a:t>
+            </a:r>
+          </a:p>
+          <a:p>
+            <a:pPr lvl="1"/>
+            <a:r>
+              <a:rPr lang="en-US" dirty="0" smtClean="0">
+                <a:hlinkClick r:id="rId5"/>
+              </a:rPr>
+              <a:t>http://github.com/edgecase/ruby_koans</a:t>
+            </a:r>
+            <a:endParaRPr lang="en-US" dirty="0" smtClean="0"/>
+          </a:p>
+          <a:p>
+            <a:pPr lvl="1"/>
+            <a:endParaRPr lang="en-US" sz="1900" dirty="0" smtClean="0"/>
+          </a:p>
+          <a:p>
+            <a:r>
+              <a:rPr lang="en-US" sz="2500" dirty="0" err="1" smtClean="0"/>
+              <a:t>Katacasts</a:t>
+            </a:r>
+            <a:r>
+              <a:rPr lang="en-US" sz="2500" dirty="0"/>
+              <a:t> </a:t>
+            </a:r>
+            <a:r>
+              <a:rPr lang="en-US" sz="2500" dirty="0" smtClean="0"/>
+              <a:t>(watch </a:t>
+            </a:r>
+            <a:r>
+              <a:rPr lang="en-US" sz="2500" dirty="0" err="1" smtClean="0"/>
+              <a:t>screencasts</a:t>
+            </a:r>
+            <a:r>
+              <a:rPr lang="en-US" sz="2500" dirty="0" smtClean="0"/>
+              <a:t> of people doing various </a:t>
+            </a:r>
+            <a:r>
+              <a:rPr lang="en-US" sz="2500" dirty="0" err="1" smtClean="0"/>
+              <a:t>katas</a:t>
+            </a:r>
+            <a:r>
+              <a:rPr lang="en-US" sz="2500" dirty="0" smtClean="0"/>
+              <a:t>)</a:t>
+            </a:r>
+          </a:p>
+          <a:p>
+            <a:pPr lvl="1"/>
+            <a:r>
+              <a:rPr lang="en-US" dirty="0" smtClean="0">
+                <a:hlinkClick r:id="rId6"/>
+              </a:rPr>
+              <a:t>http://www.katacasts.com/</a:t>
+            </a:r>
+            <a:endParaRPr lang="en-US" dirty="0" smtClean="0"/>
           </a:p>
           <a:p>
             <a:pPr lvl="1">
               <a:buNone/>
             </a:pPr>
-            <a:endParaRPr lang="en-US" sz="2800" dirty="0" smtClean="0"/>
-          </a:p>
-          <a:p>
-            <a:pPr lvl="1">
-              <a:buNone/>
-            </a:pPr>
-            <a:endParaRPr lang="en-US" sz="2800" dirty="0" smtClean="0"/>
-          </a:p>
-          <a:p>
-            <a:pPr lvl="1">
-              <a:buNone/>
-            </a:pPr>
-            <a:endParaRPr lang="en-US" sz="2800" dirty="0" smtClean="0"/>
+            <a:endParaRPr lang="en-US" sz="1900" dirty="0" smtClean="0"/>
           </a:p>
         </p:txBody>
       </p:sp>
@@ -8929,6 +8853,188 @@
           <a:p>
             <a:r>
               <a:rPr lang="en-US" dirty="0" smtClean="0"/>
+              <a:t>Resources – Training</a:t>
+            </a:r>
+            <a:endParaRPr lang="en-US" dirty="0"/>
+          </a:p>
+        </p:txBody>
+      </p:sp>
+      <p:sp>
+        <p:nvSpPr>
+          <p:cNvPr id="3" name="Content Placeholder 2"/>
+          <p:cNvSpPr>
+            <a:spLocks noGrp="1"/>
+          </p:cNvSpPr>
+          <p:nvPr>
+            <p:ph idx="1"/>
+          </p:nvPr>
+        </p:nvSpPr>
+        <p:spPr>
+          <a:xfrm>
+            <a:off x="457200" y="1600200"/>
+            <a:ext cx="8229600" cy="4953000"/>
+          </a:xfrm>
+        </p:spPr>
+        <p:txBody>
+          <a:bodyPr>
+            <a:normAutofit/>
+          </a:bodyPr>
+          <a:lstStyle/>
+          <a:p>
+            <a:r>
+              <a:rPr lang="en-US" dirty="0" smtClean="0"/>
+              <a:t>TDD Boot Camp (.NET)</a:t>
+            </a:r>
+          </a:p>
+          <a:p>
+            <a:pPr lvl="1"/>
+            <a:r>
+              <a:rPr lang="en-US" sz="2800" dirty="0" smtClean="0">
+                <a:hlinkClick r:id="rId2"/>
+              </a:rPr>
+              <a:t>http://tddbootcamp.com</a:t>
+            </a:r>
+            <a:endParaRPr lang="en-US" sz="2800" dirty="0" smtClean="0"/>
+          </a:p>
+          <a:p>
+            <a:pPr lvl="1"/>
+            <a:r>
+              <a:rPr lang="en-US" sz="2800" dirty="0" smtClean="0"/>
+              <a:t>Cincinnati – June 22-24</a:t>
+            </a:r>
+          </a:p>
+          <a:p>
+            <a:pPr lvl="1"/>
+            <a:r>
+              <a:rPr lang="en-US" sz="2800" dirty="0" smtClean="0"/>
+              <a:t>Columbus – July 13-15</a:t>
+            </a:r>
+          </a:p>
+          <a:p>
+            <a:pPr lvl="1"/>
+            <a:r>
+              <a:rPr lang="en-US" sz="2800" dirty="0" smtClean="0"/>
+              <a:t>Detroit – Aug. 18-20</a:t>
+            </a:r>
+            <a:br>
+              <a:rPr lang="en-US" sz="2800" dirty="0" smtClean="0"/>
+            </a:br>
+            <a:endParaRPr lang="en-US" sz="2800" dirty="0" smtClean="0"/>
+          </a:p>
+          <a:p>
+            <a:r>
+              <a:rPr lang="en-US" dirty="0" smtClean="0"/>
+              <a:t>Pillar Technology (Java)</a:t>
+            </a:r>
+          </a:p>
+          <a:p>
+            <a:pPr lvl="1"/>
+            <a:r>
+              <a:rPr lang="en-US" sz="2800" dirty="0" smtClean="0">
+                <a:hlinkClick r:id="rId3"/>
+              </a:rPr>
+              <a:t>http://pillartechnology.com</a:t>
+            </a:r>
+            <a:r>
+              <a:rPr lang="en-US" sz="2800" dirty="0" smtClean="0"/>
+              <a:t/>
+            </a:r>
+            <a:br>
+              <a:rPr lang="en-US" sz="2800" dirty="0" smtClean="0"/>
+            </a:br>
+            <a:endParaRPr lang="en-US" sz="2800" dirty="0" smtClean="0"/>
+          </a:p>
+          <a:p>
+            <a:r>
+              <a:rPr lang="en-US" dirty="0" err="1" smtClean="0"/>
+              <a:t>EdgeCase</a:t>
+            </a:r>
+            <a:r>
+              <a:rPr lang="en-US" dirty="0" smtClean="0"/>
+              <a:t> (Ruby on Rails)</a:t>
+            </a:r>
+          </a:p>
+          <a:p>
+            <a:pPr lvl="1"/>
+            <a:r>
+              <a:rPr lang="en-US" sz="2800" dirty="0" smtClean="0">
+                <a:hlinkClick r:id="rId4"/>
+              </a:rPr>
+              <a:t>http://edgecase.com</a:t>
+            </a:r>
+            <a:endParaRPr lang="en-US" sz="2800" dirty="0" smtClean="0"/>
+          </a:p>
+          <a:p>
+            <a:pPr lvl="1">
+              <a:buNone/>
+            </a:pPr>
+            <a:endParaRPr lang="en-US" sz="2800" dirty="0" smtClean="0"/>
+          </a:p>
+          <a:p>
+            <a:pPr lvl="1">
+              <a:buNone/>
+            </a:pPr>
+            <a:endParaRPr lang="en-US" sz="2800" dirty="0" smtClean="0"/>
+          </a:p>
+          <a:p>
+            <a:pPr lvl="1">
+              <a:buNone/>
+            </a:pPr>
+            <a:endParaRPr lang="en-US" sz="2800" dirty="0" smtClean="0"/>
+          </a:p>
+        </p:txBody>
+      </p:sp>
+    </p:spTree>
+  </p:cSld>
+  <p:clrMapOvr>
+    <a:masterClrMapping/>
+  </p:clrMapOvr>
+  <p:timing>
+    <p:tnLst>
+      <p:par>
+        <p:cTn id="1" dur="indefinite" restart="never" nodeType="tmRoot"/>
+      </p:par>
+    </p:tnLst>
+  </p:timing>
+</p:sld>
+</file>
+
+<file path=ppt/slides/slide36.xml><?xml version="1.0" encoding="utf-8"?>
+<p:sld xmlns:a="http://schemas.openxmlformats.org/drawingml/2006/main" xmlns:r="http://schemas.openxmlformats.org/officeDocument/2006/relationships" xmlns:p="http://schemas.openxmlformats.org/presentationml/2006/main">
+  <p:cSld>
+    <p:spTree>
+      <p:nvGrpSpPr>
+        <p:cNvPr id="1" name=""/>
+        <p:cNvGrpSpPr/>
+        <p:nvPr/>
+      </p:nvGrpSpPr>
+      <p:grpSpPr>
+        <a:xfrm>
+          <a:off x="0" y="0"/>
+          <a:ext cx="0" cy="0"/>
+          <a:chOff x="0" y="0"/>
+          <a:chExt cx="0" cy="0"/>
+        </a:xfrm>
+      </p:grpSpPr>
+      <p:sp>
+        <p:nvSpPr>
+          <p:cNvPr id="2" name="Title 1"/>
+          <p:cNvSpPr>
+            <a:spLocks noGrp="1"/>
+          </p:cNvSpPr>
+          <p:nvPr>
+            <p:ph type="title"/>
+          </p:nvPr>
+        </p:nvSpPr>
+        <p:spPr/>
+        <p:txBody>
+          <a:bodyPr>
+            <a:normAutofit/>
+          </a:bodyPr>
+          <a:lstStyle/>
+          <a:p>
+            <a:r>
+              <a:rPr lang="en-US" dirty="0" smtClean="0"/>
               <a:t>My Info</a:t>
             </a:r>
             <a:endParaRPr lang="en-US" dirty="0"/>
@@ -8988,13 +9094,7 @@
               <a:rPr lang="en-US" b="1" dirty="0" smtClean="0">
                 <a:hlinkClick r:id="rId3"/>
               </a:rPr>
-              <a:t>http://</a:t>
-            </a:r>
-            <a:r>
-              <a:rPr lang="en-US" b="1" dirty="0" smtClean="0">
-                <a:hlinkClick r:id="rId3"/>
-              </a:rPr>
-              <a:t>jonkruger.com/blog</a:t>
+              <a:t>http://jonkruger.com/blog</a:t>
             </a:r>
             <a:endParaRPr lang="en-US" b="1" dirty="0" smtClean="0"/>
           </a:p>

</xml_diff>

<commit_message>
updated some stuff in the ppt
</commit_message>
<xml_diff>
--- a/TDD In Action.pptx
+++ b/TDD In Action.pptx
@@ -5,7 +5,7 @@
     <p:sldMasterId id="2147483840" r:id="rId1"/>
   </p:sldMasterIdLst>
   <p:notesMasterIdLst>
-    <p:notesMasterId r:id="rId38"/>
+    <p:notesMasterId r:id="rId37"/>
   </p:notesMasterIdLst>
   <p:sldIdLst>
     <p:sldId id="320" r:id="rId2"/>
@@ -16,34 +16,33 @@
     <p:sldId id="373" r:id="rId7"/>
     <p:sldId id="376" r:id="rId8"/>
     <p:sldId id="371" r:id="rId9"/>
-    <p:sldId id="379" r:id="rId10"/>
-    <p:sldId id="390" r:id="rId11"/>
-    <p:sldId id="370" r:id="rId12"/>
-    <p:sldId id="389" r:id="rId13"/>
-    <p:sldId id="380" r:id="rId14"/>
-    <p:sldId id="381" r:id="rId15"/>
-    <p:sldId id="378" r:id="rId16"/>
-    <p:sldId id="384" r:id="rId17"/>
+    <p:sldId id="370" r:id="rId10"/>
+    <p:sldId id="389" r:id="rId11"/>
+    <p:sldId id="381" r:id="rId12"/>
+    <p:sldId id="380" r:id="rId13"/>
+    <p:sldId id="379" r:id="rId14"/>
+    <p:sldId id="390" r:id="rId15"/>
+    <p:sldId id="384" r:id="rId16"/>
+    <p:sldId id="378" r:id="rId17"/>
     <p:sldId id="377" r:id="rId18"/>
     <p:sldId id="394" r:id="rId19"/>
     <p:sldId id="386" r:id="rId20"/>
     <p:sldId id="382" r:id="rId21"/>
     <p:sldId id="383" r:id="rId22"/>
-    <p:sldId id="385" r:id="rId23"/>
-    <p:sldId id="387" r:id="rId24"/>
-    <p:sldId id="388" r:id="rId25"/>
-    <p:sldId id="391" r:id="rId26"/>
-    <p:sldId id="393" r:id="rId27"/>
-    <p:sldId id="360" r:id="rId28"/>
-    <p:sldId id="358" r:id="rId29"/>
-    <p:sldId id="359" r:id="rId30"/>
-    <p:sldId id="396" r:id="rId31"/>
-    <p:sldId id="402" r:id="rId32"/>
-    <p:sldId id="397" r:id="rId33"/>
-    <p:sldId id="401" r:id="rId34"/>
-    <p:sldId id="398" r:id="rId35"/>
-    <p:sldId id="400" r:id="rId36"/>
-    <p:sldId id="399" r:id="rId37"/>
+    <p:sldId id="387" r:id="rId23"/>
+    <p:sldId id="388" r:id="rId24"/>
+    <p:sldId id="391" r:id="rId25"/>
+    <p:sldId id="393" r:id="rId26"/>
+    <p:sldId id="360" r:id="rId27"/>
+    <p:sldId id="358" r:id="rId28"/>
+    <p:sldId id="359" r:id="rId29"/>
+    <p:sldId id="396" r:id="rId30"/>
+    <p:sldId id="402" r:id="rId31"/>
+    <p:sldId id="397" r:id="rId32"/>
+    <p:sldId id="401" r:id="rId33"/>
+    <p:sldId id="398" r:id="rId34"/>
+    <p:sldId id="400" r:id="rId35"/>
+    <p:sldId id="399" r:id="rId36"/>
   </p:sldIdLst>
   <p:sldSz cx="9144000" cy="6858000" type="screen4x3"/>
   <p:notesSz cx="6858000" cy="9144000"/>
@@ -228,7 +227,7 @@
             <a:fld id="{CE22DD2D-CE48-432A-B750-FE638311F72D}" type="datetimeFigureOut">
               <a:rPr lang="en-US" smtClean="0"/>
               <a:pPr/>
-              <a:t>5/14/2010</a:t>
+              <a:t>5/20/2010</a:t>
             </a:fld>
             <a:endParaRPr lang="en-US"/>
           </a:p>
@@ -540,6 +539,20 @@
           </a:bodyPr>
           <a:lstStyle/>
           <a:p>
+            <a:r>
+              <a:rPr lang="en-US" dirty="0" smtClean="0"/>
+              <a:t>-Lower stress</a:t>
+            </a:r>
+            <a:r>
+              <a:rPr lang="en-US" baseline="0" dirty="0" smtClean="0"/>
+              <a:t> level!</a:t>
+            </a:r>
+          </a:p>
+          <a:p>
+            <a:r>
+              <a:rPr lang="en-US" baseline="0" dirty="0" smtClean="0"/>
+              <a:t>-Not wasting time setting breakpoints and testing the debugger</a:t>
+            </a:r>
             <a:endParaRPr lang="en-US" dirty="0"/>
           </a:p>
         </p:txBody>
@@ -742,7 +755,7 @@
             <a:fld id="{46B52E04-8F68-435C-880A-7C7B12D9BA2F}" type="slidenum">
               <a:rPr lang="en-US" smtClean="0"/>
               <a:pPr/>
-              <a:t>25</a:t>
+              <a:t>24</a:t>
             </a:fld>
             <a:endParaRPr lang="en-US"/>
           </a:p>
@@ -802,34 +815,25 @@
           </a:bodyPr>
           <a:lstStyle/>
           <a:p>
-            <a:pPr marL="0" marR="0" indent="0" algn="l" defTabSz="914400" rtl="0" eaLnBrk="1" fontAlgn="auto" latinLnBrk="0" hangingPunct="1">
-              <a:lnSpc>
-                <a:spcPct val="100000"/>
-              </a:lnSpc>
-              <a:spcBef>
-                <a:spcPts val="0"/>
-              </a:spcBef>
-              <a:spcAft>
-                <a:spcPts val="0"/>
-              </a:spcAft>
-              <a:buClrTx/>
-              <a:buSzTx/>
-              <a:buFontTx/>
-              <a:buNone/>
-              <a:tabLst/>
-              <a:defRPr/>
-            </a:pPr>
             <a:r>
               <a:rPr lang="en-US" dirty="0" smtClean="0"/>
-              <a:t>Software development is a series</a:t>
+              <a:t>-If you test with</a:t>
             </a:r>
             <a:r>
               <a:rPr lang="en-US" baseline="0" dirty="0" smtClean="0"/>
-              <a:t> of translations – we need to get from an idea in someone’s head to working software.  The best way to not lose sight of that goal is to do small “translations” that will ensure that we stay focused on the original goal.</a:t>
+              <a:t> the debugger, how do you know the next day if your code is  still working?</a:t>
             </a:r>
             <a:endParaRPr lang="en-US" dirty="0" smtClean="0"/>
           </a:p>
           <a:p>
+            <a:r>
+              <a:rPr lang="en-US" dirty="0" smtClean="0"/>
+              <a:t>-Someone</a:t>
+            </a:r>
+            <a:r>
+              <a:rPr lang="en-US" baseline="0" dirty="0" smtClean="0"/>
+              <a:t> else is going to change your code someday, so now you don’t have to worry about them breaking your stuff.</a:t>
+            </a:r>
             <a:endParaRPr lang="en-US" dirty="0"/>
           </a:p>
         </p:txBody>
@@ -912,19 +916,27 @@
           </a:bodyPr>
           <a:lstStyle/>
           <a:p>
+            <a:pPr>
+              <a:buFontTx/>
+              <a:buChar char="-"/>
+            </a:pPr>
             <a:r>
               <a:rPr lang="en-US" dirty="0" smtClean="0"/>
-              <a:t>-Lower stress</a:t>
+              <a:t>Bugs cost money to find, money to write up, money to fix</a:t>
+            </a:r>
+          </a:p>
+          <a:p>
+            <a:pPr>
+              <a:buFontTx/>
+              <a:buChar char="-"/>
+            </a:pPr>
+            <a:r>
+              <a:rPr lang="en-US" dirty="0" smtClean="0"/>
+              <a:t>The</a:t>
             </a:r>
             <a:r>
               <a:rPr lang="en-US" baseline="0" dirty="0" smtClean="0"/>
-              <a:t> level!</a:t>
-            </a:r>
-          </a:p>
-          <a:p>
-            <a:r>
-              <a:rPr lang="en-US" baseline="0" dirty="0" smtClean="0"/>
-              <a:t>-Not wasting time setting breakpoints and testing the debugger</a:t>
+              <a:t> negative impact caused by bugs can be really expensive</a:t>
             </a:r>
             <a:endParaRPr lang="en-US" dirty="0"/>
           </a:p>
@@ -1008,25 +1020,6 @@
           </a:bodyPr>
           <a:lstStyle/>
           <a:p>
-            <a:r>
-              <a:rPr lang="en-US" dirty="0" smtClean="0"/>
-              <a:t>-If you test with</a:t>
-            </a:r>
-            <a:r>
-              <a:rPr lang="en-US" baseline="0" dirty="0" smtClean="0"/>
-              <a:t> the debugger, how do you know the next day if your code is  still working?</a:t>
-            </a:r>
-            <a:endParaRPr lang="en-US" dirty="0" smtClean="0"/>
-          </a:p>
-          <a:p>
-            <a:r>
-              <a:rPr lang="en-US" dirty="0" smtClean="0"/>
-              <a:t>-Someone</a:t>
-            </a:r>
-            <a:r>
-              <a:rPr lang="en-US" baseline="0" dirty="0" smtClean="0"/>
-              <a:t> else is going to change your code someday, so now you don’t have to worry about them breaking your stuff.</a:t>
-            </a:r>
             <a:endParaRPr lang="en-US" dirty="0"/>
           </a:p>
         </p:txBody>
@@ -1191,28 +1184,34 @@
           </a:bodyPr>
           <a:lstStyle/>
           <a:p>
-            <a:pPr>
+            <a:pPr marL="0" marR="0" indent="0" algn="l" defTabSz="914400" rtl="0" eaLnBrk="1" fontAlgn="auto" latinLnBrk="0" hangingPunct="1">
+              <a:lnSpc>
+                <a:spcPct val="100000"/>
+              </a:lnSpc>
+              <a:spcBef>
+                <a:spcPts val="0"/>
+              </a:spcBef>
+              <a:spcAft>
+                <a:spcPts val="0"/>
+              </a:spcAft>
+              <a:buClrTx/>
+              <a:buSzTx/>
               <a:buFontTx/>
-              <a:buChar char="-"/>
+              <a:buNone/>
+              <a:tabLst/>
+              <a:defRPr/>
             </a:pPr>
             <a:r>
               <a:rPr lang="en-US" dirty="0" smtClean="0"/>
-              <a:t>Bugs cost money to find, money to write up, money to fix</a:t>
-            </a:r>
-          </a:p>
-          <a:p>
-            <a:pPr>
-              <a:buFontTx/>
-              <a:buChar char="-"/>
-            </a:pPr>
-            <a:r>
-              <a:rPr lang="en-US" dirty="0" smtClean="0"/>
-              <a:t>The</a:t>
+              <a:t>Software development is a series</a:t>
             </a:r>
             <a:r>
               <a:rPr lang="en-US" baseline="0" dirty="0" smtClean="0"/>
-              <a:t> negative impact caused by bugs can be really expensive</a:t>
-            </a:r>
+              <a:t> of translations – we need to get from an idea in someone’s head to working software.  The best way to not lose sight of that goal is to do small “translations” that will ensure that we stay focused on the original goal.</a:t>
+            </a:r>
+            <a:endParaRPr lang="en-US" dirty="0" smtClean="0"/>
+          </a:p>
+          <a:p>
             <a:endParaRPr lang="en-US" dirty="0"/>
           </a:p>
         </p:txBody>
@@ -1295,27 +1294,13 @@
           </a:bodyPr>
           <a:lstStyle/>
           <a:p>
-            <a:pPr>
-              <a:buFontTx/>
-              <a:buChar char="-"/>
-            </a:pPr>
             <a:r>
               <a:rPr lang="en-US" dirty="0" smtClean="0"/>
-              <a:t>We won’t waste time on code</a:t>
+              <a:t>-Think about one thing at</a:t>
             </a:r>
             <a:r>
               <a:rPr lang="en-US" baseline="0" dirty="0" smtClean="0"/>
-              <a:t> that we don’t need to write</a:t>
-            </a:r>
-          </a:p>
-          <a:p>
-            <a:pPr>
-              <a:buFontTx/>
-              <a:buChar char="-"/>
-            </a:pPr>
-            <a:r>
-              <a:rPr lang="en-US" baseline="0" dirty="0" smtClean="0"/>
-              <a:t>Helps prevent gold plating</a:t>
+              <a:t> a time… much easier, less stressful</a:t>
             </a:r>
             <a:endParaRPr lang="en-US" dirty="0"/>
           </a:p>
@@ -1399,13 +1384,27 @@
           </a:bodyPr>
           <a:lstStyle/>
           <a:p>
+            <a:pPr>
+              <a:buFontTx/>
+              <a:buChar char="-"/>
+            </a:pPr>
             <a:r>
               <a:rPr lang="en-US" dirty="0" smtClean="0"/>
-              <a:t>-Think about one thing at</a:t>
+              <a:t>We won’t waste time on code</a:t>
             </a:r>
             <a:r>
               <a:rPr lang="en-US" baseline="0" dirty="0" smtClean="0"/>
-              <a:t> a time… much easier, less stressful</a:t>
+              <a:t> that we don’t need to write</a:t>
+            </a:r>
+          </a:p>
+          <a:p>
+            <a:pPr>
+              <a:buFontTx/>
+              <a:buChar char="-"/>
+            </a:pPr>
+            <a:r>
+              <a:rPr lang="en-US" baseline="0" dirty="0" smtClean="0"/>
+              <a:t>Helps prevent gold plating</a:t>
             </a:r>
             <a:endParaRPr lang="en-US" dirty="0"/>
           </a:p>
@@ -1699,7 +1698,7 @@
             <a:fld id="{C3F416CD-67A3-4CF0-A210-F6AF31AC147F}" type="datetimeFigureOut">
               <a:rPr lang="en-US" smtClean="0"/>
               <a:pPr/>
-              <a:t>5/14/2010</a:t>
+              <a:t>5/20/2010</a:t>
             </a:fld>
             <a:endParaRPr lang="en-US"/>
           </a:p>
@@ -1879,7 +1878,7 @@
             <a:fld id="{C3F416CD-67A3-4CF0-A210-F6AF31AC147F}" type="datetimeFigureOut">
               <a:rPr lang="en-US" smtClean="0"/>
               <a:pPr/>
-              <a:t>5/14/2010</a:t>
+              <a:t>5/20/2010</a:t>
             </a:fld>
             <a:endParaRPr lang="en-US"/>
           </a:p>
@@ -2056,7 +2055,7 @@
             <a:fld id="{C3F416CD-67A3-4CF0-A210-F6AF31AC147F}" type="datetimeFigureOut">
               <a:rPr lang="en-US" smtClean="0"/>
               <a:pPr/>
-              <a:t>5/14/2010</a:t>
+              <a:t>5/20/2010</a:t>
             </a:fld>
             <a:endParaRPr lang="en-US"/>
           </a:p>
@@ -2223,7 +2222,7 @@
             <a:fld id="{C3F416CD-67A3-4CF0-A210-F6AF31AC147F}" type="datetimeFigureOut">
               <a:rPr lang="en-US" smtClean="0"/>
               <a:pPr/>
-              <a:t>5/14/2010</a:t>
+              <a:t>5/20/2010</a:t>
             </a:fld>
             <a:endParaRPr lang="en-US"/>
           </a:p>
@@ -2436,7 +2435,7 @@
             <a:fld id="{C3F416CD-67A3-4CF0-A210-F6AF31AC147F}" type="datetimeFigureOut">
               <a:rPr lang="en-US" smtClean="0"/>
               <a:pPr/>
-              <a:t>5/14/2010</a:t>
+              <a:t>5/20/2010</a:t>
             </a:fld>
             <a:endParaRPr lang="en-US"/>
           </a:p>
@@ -2721,7 +2720,7 @@
             <a:fld id="{C3F416CD-67A3-4CF0-A210-F6AF31AC147F}" type="datetimeFigureOut">
               <a:rPr lang="en-US" smtClean="0"/>
               <a:pPr/>
-              <a:t>5/14/2010</a:t>
+              <a:t>5/20/2010</a:t>
             </a:fld>
             <a:endParaRPr lang="en-US"/>
           </a:p>
@@ -3153,7 +3152,7 @@
             <a:fld id="{C3F416CD-67A3-4CF0-A210-F6AF31AC147F}" type="datetimeFigureOut">
               <a:rPr lang="en-US" smtClean="0"/>
               <a:pPr algn="l" eaLnBrk="1" latinLnBrk="0" hangingPunct="1"/>
-              <a:t>5/14/2010</a:t>
+              <a:t>5/20/2010</a:t>
             </a:fld>
             <a:endParaRPr lang="en-US"/>
           </a:p>
@@ -3273,7 +3272,7 @@
             <a:fld id="{C3F416CD-67A3-4CF0-A210-F6AF31AC147F}" type="datetimeFigureOut">
               <a:rPr lang="en-US" smtClean="0"/>
               <a:pPr/>
-              <a:t>5/14/2010</a:t>
+              <a:t>5/20/2010</a:t>
             </a:fld>
             <a:endParaRPr lang="en-US"/>
           </a:p>
@@ -3365,7 +3364,7 @@
             <a:fld id="{C3F416CD-67A3-4CF0-A210-F6AF31AC147F}" type="datetimeFigureOut">
               <a:rPr lang="en-US" smtClean="0"/>
               <a:pPr/>
-              <a:t>5/14/2010</a:t>
+              <a:t>5/20/2010</a:t>
             </a:fld>
             <a:endParaRPr lang="en-US"/>
           </a:p>
@@ -3656,7 +3655,7 @@
             <a:fld id="{C3F416CD-67A3-4CF0-A210-F6AF31AC147F}" type="datetimeFigureOut">
               <a:rPr lang="en-US" smtClean="0"/>
               <a:pPr/>
-              <a:t>5/14/2010</a:t>
+              <a:t>5/20/2010</a:t>
             </a:fld>
             <a:endParaRPr lang="en-US"/>
           </a:p>
@@ -3983,7 +3982,7 @@
             <a:fld id="{C3F416CD-67A3-4CF0-A210-F6AF31AC147F}" type="datetimeFigureOut">
               <a:rPr lang="en-US" smtClean="0"/>
               <a:pPr/>
-              <a:t>5/14/2010</a:t>
+              <a:t>5/20/2010</a:t>
             </a:fld>
             <a:endParaRPr lang="en-US"/>
           </a:p>
@@ -4204,7 +4203,7 @@
             <a:fld id="{C3F416CD-67A3-4CF0-A210-F6AF31AC147F}" type="datetimeFigureOut">
               <a:rPr lang="en-US" smtClean="0"/>
               <a:pPr algn="l" eaLnBrk="1" latinLnBrk="0" hangingPunct="1"/>
-              <a:t>5/14/2010</a:t>
+              <a:t>5/20/2010</a:t>
             </a:fld>
             <a:endParaRPr lang="en-US" sz="800" dirty="0">
               <a:solidFill>
@@ -4633,7 +4632,7 @@
           <a:p>
             <a:r>
               <a:rPr lang="en-US" dirty="0" smtClean="0"/>
-              <a:t>Behavior Driven Development</a:t>
+              <a:t>Benefits of TDD</a:t>
             </a:r>
             <a:endParaRPr lang="en-US" dirty="0"/>
           </a:p>
@@ -4651,27 +4650,19 @@
         </p:nvSpPr>
         <p:spPr/>
         <p:txBody>
-          <a:bodyPr/>
-          <a:lstStyle/>
-          <a:p>
-            <a:r>
-              <a:rPr lang="en-US" dirty="0" smtClean="0"/>
-              <a:t>Testing the </a:t>
-            </a:r>
-            <a:r>
-              <a:rPr lang="en-US" i="1" dirty="0" smtClean="0"/>
-              <a:t>behavior</a:t>
-            </a:r>
-            <a:r>
-              <a:rPr lang="en-US" dirty="0" smtClean="0"/>
-              <a:t> of the system (not just data returned by a method)</a:t>
-            </a:r>
-          </a:p>
-          <a:p>
-            <a:r>
-              <a:rPr lang="en-US" dirty="0" smtClean="0"/>
-              <a:t>Defining what it means for your system to work correctly (not just verifying that code works)</a:t>
-            </a:r>
+          <a:bodyPr anchor="ctr">
+            <a:normAutofit/>
+          </a:bodyPr>
+          <a:lstStyle/>
+          <a:p>
+            <a:pPr algn="ctr">
+              <a:buNone/>
+            </a:pPr>
+            <a:r>
+              <a:rPr lang="en-US" sz="4400" b="1" dirty="0" smtClean="0"/>
+              <a:t>We know that our code will continue to work</a:t>
+            </a:r>
+            <a:endParaRPr lang="en-US" sz="4400" b="1" dirty="0"/>
           </a:p>
         </p:txBody>
       </p:sp>
@@ -4752,7 +4743,7 @@
             </a:pPr>
             <a:r>
               <a:rPr lang="en-US" sz="4400" b="1" dirty="0" smtClean="0"/>
-              <a:t>We know that our code is working!</a:t>
+              <a:t>We didn’t write bugs</a:t>
             </a:r>
             <a:endParaRPr lang="en-US" sz="4400" b="1" dirty="0"/>
           </a:p>
@@ -4835,7 +4826,7 @@
             </a:pPr>
             <a:r>
               <a:rPr lang="en-US" sz="4400" b="1" dirty="0" smtClean="0"/>
-              <a:t>We know that our code will continue to work</a:t>
+              <a:t>We know when we are done</a:t>
             </a:r>
             <a:endParaRPr lang="en-US" sz="4400" b="1" dirty="0"/>
           </a:p>
@@ -4918,7 +4909,7 @@
             </a:pPr>
             <a:r>
               <a:rPr lang="en-US" sz="4400" b="1" dirty="0" smtClean="0"/>
-              <a:t>We know when we are done</a:t>
+              <a:t>We incrementally translated the requirements </a:t>
             </a:r>
             <a:endParaRPr lang="en-US" sz="4400" b="1" dirty="0"/>
           </a:p>
@@ -4973,7 +4964,7 @@
           <a:p>
             <a:r>
               <a:rPr lang="en-US" dirty="0" smtClean="0"/>
-              <a:t>Benefits of TDD</a:t>
+              <a:t>Behavior Driven Development</a:t>
             </a:r>
             <a:endParaRPr lang="en-US" dirty="0"/>
           </a:p>
@@ -4991,19 +4982,27 @@
         </p:nvSpPr>
         <p:spPr/>
         <p:txBody>
-          <a:bodyPr anchor="ctr">
-            <a:normAutofit/>
-          </a:bodyPr>
-          <a:lstStyle/>
-          <a:p>
-            <a:pPr algn="ctr">
-              <a:buNone/>
-            </a:pPr>
-            <a:r>
-              <a:rPr lang="en-US" sz="4400" b="1" dirty="0" smtClean="0"/>
-              <a:t>We didn’t write bugs</a:t>
-            </a:r>
-            <a:endParaRPr lang="en-US" sz="4400" b="1" dirty="0"/>
+          <a:bodyPr/>
+          <a:lstStyle/>
+          <a:p>
+            <a:r>
+              <a:rPr lang="en-US" dirty="0" smtClean="0"/>
+              <a:t>Testing the </a:t>
+            </a:r>
+            <a:r>
+              <a:rPr lang="en-US" i="1" dirty="0" smtClean="0"/>
+              <a:t>behavior</a:t>
+            </a:r>
+            <a:r>
+              <a:rPr lang="en-US" dirty="0" smtClean="0"/>
+              <a:t> of the system (not just data returned by a method)</a:t>
+            </a:r>
+          </a:p>
+          <a:p>
+            <a:r>
+              <a:rPr lang="en-US" dirty="0" smtClean="0"/>
+              <a:t>Defining what it means for your system to work correctly (not just verifying that code works)</a:t>
+            </a:r>
           </a:p>
         </p:txBody>
       </p:sp>
@@ -5084,7 +5083,7 @@
             </a:pPr>
             <a:r>
               <a:rPr lang="en-US" sz="4400" b="1" dirty="0" smtClean="0"/>
-              <a:t>We only wrote as much code as we needed to make the tests pass</a:t>
+              <a:t>Concentrate on the requirements/tests, then concentrate on implementation</a:t>
             </a:r>
             <a:endParaRPr lang="en-US" sz="4400" b="1" dirty="0"/>
           </a:p>
@@ -5167,7 +5166,7 @@
             </a:pPr>
             <a:r>
               <a:rPr lang="en-US" sz="4400" b="1" dirty="0" smtClean="0"/>
-              <a:t>Concentrate on the requirements/tests, then concentrate on implementation</a:t>
+              <a:t>We only wrote as much code as we needed to make the tests pass</a:t>
             </a:r>
             <a:endParaRPr lang="en-US" sz="4400" b="1" dirty="0"/>
           </a:p>
@@ -6063,7 +6062,7 @@
             </a:pPr>
             <a:r>
               <a:rPr lang="en-US" sz="4400" b="1" dirty="0" smtClean="0"/>
-              <a:t>We can make changes without fear of breaking things</a:t>
+              <a:t>We can quickly regression test our code</a:t>
             </a:r>
             <a:endParaRPr lang="en-US" sz="4400" b="1" dirty="0"/>
           </a:p>
@@ -6085,89 +6084,6 @@
 </file>
 
 <file path=ppt/slides/slide23.xml><?xml version="1.0" encoding="utf-8"?>
-<p:sld xmlns:a="http://schemas.openxmlformats.org/drawingml/2006/main" xmlns:r="http://schemas.openxmlformats.org/officeDocument/2006/relationships" xmlns:p="http://schemas.openxmlformats.org/presentationml/2006/main">
-  <p:cSld>
-    <p:spTree>
-      <p:nvGrpSpPr>
-        <p:cNvPr id="1" name=""/>
-        <p:cNvGrpSpPr/>
-        <p:nvPr/>
-      </p:nvGrpSpPr>
-      <p:grpSpPr>
-        <a:xfrm>
-          <a:off x="0" y="0"/>
-          <a:ext cx="0" cy="0"/>
-          <a:chOff x="0" y="0"/>
-          <a:chExt cx="0" cy="0"/>
-        </a:xfrm>
-      </p:grpSpPr>
-      <p:sp>
-        <p:nvSpPr>
-          <p:cNvPr id="2" name="Title 1"/>
-          <p:cNvSpPr>
-            <a:spLocks noGrp="1"/>
-          </p:cNvSpPr>
-          <p:nvPr>
-            <p:ph type="title"/>
-          </p:nvPr>
-        </p:nvSpPr>
-        <p:spPr/>
-        <p:txBody>
-          <a:bodyPr/>
-          <a:lstStyle/>
-          <a:p>
-            <a:r>
-              <a:rPr lang="en-US" dirty="0" smtClean="0"/>
-              <a:t>Benefits of TDD</a:t>
-            </a:r>
-            <a:endParaRPr lang="en-US" dirty="0"/>
-          </a:p>
-        </p:txBody>
-      </p:sp>
-      <p:sp>
-        <p:nvSpPr>
-          <p:cNvPr id="3" name="Content Placeholder 2"/>
-          <p:cNvSpPr>
-            <a:spLocks noGrp="1"/>
-          </p:cNvSpPr>
-          <p:nvPr>
-            <p:ph idx="1"/>
-          </p:nvPr>
-        </p:nvSpPr>
-        <p:spPr/>
-        <p:txBody>
-          <a:bodyPr anchor="ctr">
-            <a:normAutofit/>
-          </a:bodyPr>
-          <a:lstStyle/>
-          <a:p>
-            <a:pPr algn="ctr">
-              <a:buNone/>
-            </a:pPr>
-            <a:r>
-              <a:rPr lang="en-US" sz="4400" b="1" dirty="0" smtClean="0"/>
-              <a:t>We can quickly regression test our code</a:t>
-            </a:r>
-            <a:endParaRPr lang="en-US" sz="4400" b="1" dirty="0"/>
-          </a:p>
-        </p:txBody>
-      </p:sp>
-    </p:spTree>
-  </p:cSld>
-  <p:clrMapOvr>
-    <a:masterClrMapping/>
-  </p:clrMapOvr>
-  <p:timing>
-    <p:tnLst>
-      <p:par>
-        <p:cTn id="1" dur="indefinite" restart="never" nodeType="tmRoot"/>
-      </p:par>
-    </p:tnLst>
-  </p:timing>
-</p:sld>
-</file>
-
-<file path=ppt/slides/slide24.xml><?xml version="1.0" encoding="utf-8"?>
 <p:sld xmlns:a="http://schemas.openxmlformats.org/drawingml/2006/main" xmlns:r="http://schemas.openxmlformats.org/officeDocument/2006/relationships" xmlns:p="http://schemas.openxmlformats.org/presentationml/2006/main">
   <p:cSld>
     <p:spTree>
@@ -6486,7 +6402,7 @@
 </p:sld>
 </file>
 
-<file path=ppt/slides/slide25.xml><?xml version="1.0" encoding="utf-8"?>
+<file path=ppt/slides/slide24.xml><?xml version="1.0" encoding="utf-8"?>
 <p:sld xmlns:a="http://schemas.openxmlformats.org/drawingml/2006/main" xmlns:r="http://schemas.openxmlformats.org/officeDocument/2006/relationships" xmlns:p="http://schemas.openxmlformats.org/presentationml/2006/main">
   <p:cSld>
     <p:spTree>
@@ -6569,7 +6485,7 @@
 </p:sld>
 </file>
 
-<file path=ppt/slides/slide26.xml><?xml version="1.0" encoding="utf-8"?>
+<file path=ppt/slides/slide25.xml><?xml version="1.0" encoding="utf-8"?>
 <p:sld xmlns:a="http://schemas.openxmlformats.org/drawingml/2006/main" xmlns:r="http://schemas.openxmlformats.org/officeDocument/2006/relationships" xmlns:p="http://schemas.openxmlformats.org/presentationml/2006/main">
   <p:cSld>
     <p:spTree>
@@ -7339,7 +7255,7 @@
 </p:sld>
 </file>
 
-<file path=ppt/slides/slide27.xml><?xml version="1.0" encoding="utf-8"?>
+<file path=ppt/slides/slide26.xml><?xml version="1.0" encoding="utf-8"?>
 <p:sld xmlns:a="http://schemas.openxmlformats.org/drawingml/2006/main" xmlns:r="http://schemas.openxmlformats.org/officeDocument/2006/relationships" xmlns:p="http://schemas.openxmlformats.org/presentationml/2006/main">
   <p:cSld>
     <p:spTree>
@@ -7419,7 +7335,7 @@
 </p:sld>
 </file>
 
-<file path=ppt/slides/slide28.xml><?xml version="1.0" encoding="utf-8"?>
+<file path=ppt/slides/slide27.xml><?xml version="1.0" encoding="utf-8"?>
 <p:sld xmlns:a="http://schemas.openxmlformats.org/drawingml/2006/main" xmlns:r="http://schemas.openxmlformats.org/officeDocument/2006/relationships" xmlns:p="http://schemas.openxmlformats.org/presentationml/2006/main">
   <p:cSld>
     <p:spTree>
@@ -7555,7 +7471,7 @@
 </p:sld>
 </file>
 
-<file path=ppt/slides/slide29.xml><?xml version="1.0" encoding="utf-8"?>
+<file path=ppt/slides/slide28.xml><?xml version="1.0" encoding="utf-8"?>
 <p:sld xmlns:a="http://schemas.openxmlformats.org/drawingml/2006/main" xmlns:r="http://schemas.openxmlformats.org/officeDocument/2006/relationships" xmlns:p="http://schemas.openxmlformats.org/presentationml/2006/main">
   <p:cSld>
     <p:spTree>
@@ -7675,6 +7591,156 @@
 </p:sld>
 </file>
 
+<file path=ppt/slides/slide29.xml><?xml version="1.0" encoding="utf-8"?>
+<p:sld xmlns:a="http://schemas.openxmlformats.org/drawingml/2006/main" xmlns:r="http://schemas.openxmlformats.org/officeDocument/2006/relationships" xmlns:p="http://schemas.openxmlformats.org/presentationml/2006/main">
+  <p:cSld>
+    <p:spTree>
+      <p:nvGrpSpPr>
+        <p:cNvPr id="1" name=""/>
+        <p:cNvGrpSpPr/>
+        <p:nvPr/>
+      </p:nvGrpSpPr>
+      <p:grpSpPr>
+        <a:xfrm>
+          <a:off x="0" y="0"/>
+          <a:ext cx="0" cy="0"/>
+          <a:chOff x="0" y="0"/>
+          <a:chExt cx="0" cy="0"/>
+        </a:xfrm>
+      </p:grpSpPr>
+      <p:sp>
+        <p:nvSpPr>
+          <p:cNvPr id="2" name="Title 1"/>
+          <p:cNvSpPr>
+            <a:spLocks noGrp="1"/>
+          </p:cNvSpPr>
+          <p:nvPr>
+            <p:ph type="title"/>
+          </p:nvPr>
+        </p:nvSpPr>
+        <p:spPr/>
+        <p:txBody>
+          <a:bodyPr>
+            <a:normAutofit fontScale="90000"/>
+          </a:bodyPr>
+          <a:lstStyle/>
+          <a:p>
+            <a:r>
+              <a:rPr lang="en-US" dirty="0" smtClean="0"/>
+              <a:t>Resources - Cost of unit testing</a:t>
+            </a:r>
+            <a:endParaRPr lang="en-US" dirty="0"/>
+          </a:p>
+        </p:txBody>
+      </p:sp>
+      <p:sp>
+        <p:nvSpPr>
+          <p:cNvPr id="3" name="Content Placeholder 2"/>
+          <p:cNvSpPr>
+            <a:spLocks noGrp="1"/>
+          </p:cNvSpPr>
+          <p:nvPr>
+            <p:ph idx="1"/>
+          </p:nvPr>
+        </p:nvSpPr>
+        <p:spPr/>
+        <p:txBody>
+          <a:bodyPr/>
+          <a:lstStyle/>
+          <a:p>
+            <a:r>
+              <a:rPr lang="en-US" sz="2400" dirty="0" smtClean="0"/>
+              <a:t>Microsoft Research – “Realizing quality improvement through test driven development: results and experiences of four industrial teams”</a:t>
+            </a:r>
+          </a:p>
+          <a:p>
+            <a:pPr lvl="1"/>
+            <a:r>
+              <a:rPr lang="en-US" sz="1800" b="1" dirty="0" smtClean="0">
+                <a:hlinkClick r:id="rId2"/>
+              </a:rPr>
+              <a:t>http://research.microsoft.com/en-us/projects/esm/nagappan_tdd.pdf</a:t>
+            </a:r>
+            <a:endParaRPr lang="en-US" sz="1800" b="1" dirty="0" smtClean="0"/>
+          </a:p>
+          <a:p>
+            <a:endParaRPr lang="en-US" sz="2400" b="1" dirty="0" smtClean="0"/>
+          </a:p>
+          <a:p>
+            <a:r>
+              <a:rPr lang="en-US" sz="2400" dirty="0" smtClean="0"/>
+              <a:t>Cost of Testing, by </a:t>
+            </a:r>
+            <a:r>
+              <a:rPr lang="en-US" sz="2400" dirty="0" err="1" smtClean="0"/>
+              <a:t>Misko</a:t>
+            </a:r>
+            <a:r>
+              <a:rPr lang="en-US" sz="2400" dirty="0" smtClean="0"/>
+              <a:t> </a:t>
+            </a:r>
+            <a:r>
+              <a:rPr lang="en-US" sz="2400" dirty="0" err="1" smtClean="0"/>
+              <a:t>Hevery</a:t>
+            </a:r>
+            <a:r>
+              <a:rPr lang="en-US" sz="2400" dirty="0" smtClean="0"/>
+              <a:t> (Agile Coach/Java developer at Google)</a:t>
+            </a:r>
+          </a:p>
+          <a:p>
+            <a:pPr lvl="1"/>
+            <a:r>
+              <a:rPr lang="en-US" sz="1800" b="1" dirty="0" smtClean="0">
+                <a:hlinkClick r:id="rId3"/>
+              </a:rPr>
+              <a:t>http://misko.hevery.com/2009/10/01/cost-of-testing/</a:t>
+            </a:r>
+            <a:endParaRPr lang="en-US" sz="1800" b="1" dirty="0" smtClean="0"/>
+          </a:p>
+          <a:p>
+            <a:pPr lvl="1"/>
+            <a:endParaRPr lang="en-US" sz="1800" b="1" dirty="0" smtClean="0"/>
+          </a:p>
+          <a:p>
+            <a:r>
+              <a:rPr lang="en-US" sz="2400" dirty="0" smtClean="0"/>
+              <a:t>TDD Derangement Syndrome, by Uncle Bob Martin</a:t>
+            </a:r>
+          </a:p>
+          <a:p>
+            <a:pPr lvl="1"/>
+            <a:r>
+              <a:rPr lang="en-US" sz="1800" b="1" dirty="0" smtClean="0">
+                <a:hlinkClick r:id="rId4"/>
+              </a:rPr>
+              <a:t>http://blog.objectmentor.com/articles/2009/10/07/tdd-derangement-syndrome</a:t>
+            </a:r>
+            <a:endParaRPr lang="en-US" sz="1800" b="1" dirty="0" smtClean="0"/>
+          </a:p>
+          <a:p>
+            <a:endParaRPr lang="en-US" sz="2400" b="1" dirty="0" smtClean="0"/>
+          </a:p>
+          <a:p>
+            <a:endParaRPr lang="en-US" dirty="0"/>
+          </a:p>
+        </p:txBody>
+      </p:sp>
+    </p:spTree>
+  </p:cSld>
+  <p:clrMapOvr>
+    <a:masterClrMapping/>
+  </p:clrMapOvr>
+  <p:timing>
+    <p:tnLst>
+      <p:par>
+        <p:cTn id="1" dur="indefinite" restart="never" nodeType="tmRoot"/>
+      </p:par>
+    </p:tnLst>
+  </p:timing>
+</p:sld>
+</file>
+
 <file path=ppt/slides/slide3.xml><?xml version="1.0" encoding="utf-8"?>
 <p:sld xmlns:a="http://schemas.openxmlformats.org/drawingml/2006/main" xmlns:r="http://schemas.openxmlformats.org/officeDocument/2006/relationships" xmlns:p="http://schemas.openxmlformats.org/presentationml/2006/main">
   <p:cSld>
@@ -7979,13 +8045,13 @@
         <p:spPr/>
         <p:txBody>
           <a:bodyPr>
-            <a:normAutofit fontScale="90000"/>
+            <a:normAutofit/>
           </a:bodyPr>
           <a:lstStyle/>
           <a:p>
             <a:r>
               <a:rPr lang="en-US" dirty="0" smtClean="0"/>
-              <a:t>Resources - Cost of unit testing</a:t>
+              <a:t>Resources - Tools</a:t>
             </a:r>
             <a:endParaRPr lang="en-US" dirty="0"/>
           </a:p>
@@ -8003,84 +8069,104 @@
         </p:nvSpPr>
         <p:spPr/>
         <p:txBody>
-          <a:bodyPr/>
+          <a:bodyPr>
+            <a:normAutofit/>
+          </a:bodyPr>
           <a:lstStyle/>
           <a:p>
             <a:r>
               <a:rPr lang="en-US" sz="2400" dirty="0" smtClean="0"/>
-              <a:t>Microsoft Research – “Realizing quality improvement through test driven development: results and experiences of four industrial teams”</a:t>
+              <a:t>.NET</a:t>
             </a:r>
           </a:p>
           <a:p>
             <a:pPr lvl="1"/>
             <a:r>
-              <a:rPr lang="en-US" sz="1800" b="1" dirty="0" smtClean="0">
+              <a:rPr lang="en-US" sz="2400" dirty="0" smtClean="0"/>
+              <a:t>NUnit – </a:t>
+            </a:r>
+            <a:r>
+              <a:rPr lang="en-US" sz="2400" dirty="0" smtClean="0">
                 <a:hlinkClick r:id="rId2"/>
               </a:rPr>
-              <a:t>http://research.microsoft.com/en-us/projects/esm/nagappan_tdd.pdf</a:t>
-            </a:r>
-            <a:endParaRPr lang="en-US" sz="1800" b="1" dirty="0" smtClean="0"/>
-          </a:p>
-          <a:p>
-            <a:endParaRPr lang="en-US" sz="2400" b="1" dirty="0" smtClean="0"/>
-          </a:p>
-          <a:p>
+              <a:t>http://nunit.org</a:t>
+            </a:r>
+            <a:endParaRPr lang="en-US" sz="2400" dirty="0" smtClean="0"/>
+          </a:p>
+          <a:p>
+            <a:pPr lvl="1"/>
             <a:r>
               <a:rPr lang="en-US" sz="2400" dirty="0" smtClean="0"/>
-              <a:t>Cost of Testing, by </a:t>
-            </a:r>
-            <a:r>
-              <a:rPr lang="en-US" sz="2400" dirty="0" err="1" smtClean="0"/>
-              <a:t>Misko</a:t>
-            </a:r>
-            <a:r>
-              <a:rPr lang="en-US" sz="2400" dirty="0" smtClean="0"/>
-              <a:t> </a:t>
-            </a:r>
-            <a:r>
-              <a:rPr lang="en-US" sz="2400" dirty="0" err="1" smtClean="0"/>
-              <a:t>Hevery</a:t>
-            </a:r>
-            <a:r>
-              <a:rPr lang="en-US" sz="2400" dirty="0" smtClean="0"/>
-              <a:t> (Agile Coach/Java developer at Google)</a:t>
-            </a:r>
-          </a:p>
-          <a:p>
-            <a:pPr lvl="1"/>
-            <a:r>
-              <a:rPr lang="en-US" sz="1800" b="1" dirty="0" smtClean="0">
+              <a:t>Should – </a:t>
+            </a:r>
+            <a:r>
+              <a:rPr lang="en-US" sz="2400" dirty="0" smtClean="0">
                 <a:hlinkClick r:id="rId3"/>
               </a:rPr>
-              <a:t>http://misko.hevery.com/2009/10/01/cost-of-testing/</a:t>
-            </a:r>
-            <a:endParaRPr lang="en-US" sz="1800" b="1" dirty="0" smtClean="0"/>
+              <a:t>http://should.codeplex.com</a:t>
+            </a:r>
+            <a:endParaRPr lang="en-US" sz="2400" dirty="0" smtClean="0"/>
+          </a:p>
+          <a:p>
+            <a:r>
+              <a:rPr lang="en-US" sz="2400" dirty="0" smtClean="0"/>
+              <a:t>Java</a:t>
+            </a:r>
           </a:p>
           <a:p>
             <a:pPr lvl="1"/>
-            <a:endParaRPr lang="en-US" sz="1800" b="1" dirty="0" smtClean="0"/>
-          </a:p>
-          <a:p>
             <a:r>
               <a:rPr lang="en-US" sz="2400" dirty="0" smtClean="0"/>
-              <a:t>TDD Derangement Syndrome, by Uncle Bob Martin</a:t>
-            </a:r>
+              <a:t>???????????????</a:t>
+            </a:r>
+          </a:p>
+          <a:p>
+            <a:r>
+              <a:rPr lang="en-US" sz="2400" dirty="0" smtClean="0"/>
+              <a:t>Ruby</a:t>
+            </a:r>
+            <a:endParaRPr lang="en-US" sz="2400" dirty="0" smtClean="0"/>
           </a:p>
           <a:p>
             <a:pPr lvl="1"/>
             <a:r>
-              <a:rPr lang="en-US" sz="1800" b="1" dirty="0" smtClean="0">
+              <a:rPr lang="en-US" sz="2400" dirty="0" smtClean="0"/>
+              <a:t>RSpec – </a:t>
+            </a:r>
+            <a:r>
+              <a:rPr lang="en-US" sz="2400" dirty="0" smtClean="0">
                 <a:hlinkClick r:id="rId4"/>
               </a:rPr>
-              <a:t>http://blog.objectmentor.com/articles/2009/10/07/tdd-derangement-syndrome</a:t>
-            </a:r>
-            <a:endParaRPr lang="en-US" sz="1800" b="1" dirty="0" smtClean="0"/>
-          </a:p>
-          <a:p>
-            <a:endParaRPr lang="en-US" sz="2400" b="1" dirty="0" smtClean="0"/>
-          </a:p>
-          <a:p>
-            <a:endParaRPr lang="en-US" dirty="0"/>
+              <a:t>http://rspec.info</a:t>
+            </a:r>
+            <a:r>
+              <a:rPr lang="en-US" sz="2400" dirty="0" smtClean="0"/>
+              <a:t>, or gem install </a:t>
+            </a:r>
+            <a:r>
+              <a:rPr lang="en-US" sz="2400" dirty="0" err="1" smtClean="0"/>
+              <a:t>rspec</a:t>
+            </a:r>
+            <a:endParaRPr lang="en-US" sz="2400" dirty="0" smtClean="0"/>
+          </a:p>
+          <a:p>
+            <a:r>
+              <a:rPr lang="en-US" sz="2400" dirty="0" smtClean="0"/>
+              <a:t>Specs2Tests – </a:t>
+            </a:r>
+            <a:r>
+              <a:rPr lang="en-US" sz="2400" dirty="0" smtClean="0">
+                <a:hlinkClick r:id="rId5"/>
+              </a:rPr>
+              <a:t>http://github.com/jonkruger/specs2tests</a:t>
+            </a:r>
+            <a:endParaRPr lang="en-US" sz="2400" dirty="0" smtClean="0"/>
+          </a:p>
+          <a:p>
+            <a:pPr>
+              <a:buNone/>
+            </a:pPr>
+            <a:endParaRPr lang="en-US" sz="2400" dirty="0" smtClean="0"/>
           </a:p>
         </p:txBody>
       </p:sp>
@@ -8135,11 +8221,7 @@
           <a:p>
             <a:r>
               <a:rPr lang="en-US" dirty="0" smtClean="0"/>
-              <a:t>Resources - </a:t>
-            </a:r>
-            <a:r>
-              <a:rPr lang="en-US" dirty="0" smtClean="0"/>
-              <a:t>Tools</a:t>
+              <a:t>Resources – Learning TDD</a:t>
             </a:r>
             <a:endParaRPr lang="en-US" dirty="0"/>
           </a:p>
@@ -8155,54 +8237,135 @@
             <p:ph idx="1"/>
           </p:nvPr>
         </p:nvSpPr>
-        <p:spPr/>
-        <p:txBody>
-          <a:bodyPr/>
+        <p:spPr>
+          <a:xfrm>
+            <a:off x="457200" y="1600200"/>
+            <a:ext cx="8229600" cy="5105400"/>
+          </a:xfrm>
+        </p:spPr>
+        <p:txBody>
+          <a:bodyPr>
+            <a:normAutofit lnSpcReduction="10000"/>
+          </a:bodyPr>
           <a:lstStyle/>
           <a:p>
             <a:r>
               <a:rPr lang="en-US" sz="2400" dirty="0" smtClean="0"/>
-              <a:t>Specs2Tests</a:t>
-            </a:r>
+              <a:t>Behavior Driven Development</a:t>
+            </a:r>
+          </a:p>
+          <a:p>
+            <a:pPr lvl="1"/>
+            <a:r>
+              <a:rPr lang="en-US" sz="1800" b="1" dirty="0" smtClean="0">
+                <a:hlinkClick r:id="rId2"/>
+              </a:rPr>
+              <a:t>http://www.code-magazine.com/article.aspx?quickid=0805061&amp;page=1</a:t>
+            </a:r>
+            <a:endParaRPr lang="en-US" sz="1800" b="1" dirty="0" smtClean="0"/>
+          </a:p>
+          <a:p>
+            <a:pPr lvl="1"/>
+            <a:endParaRPr lang="en-US" sz="1800" b="1" dirty="0" smtClean="0"/>
           </a:p>
           <a:p>
             <a:r>
               <a:rPr lang="en-US" sz="2400" dirty="0" smtClean="0"/>
-              <a:t>Should/</a:t>
+              <a:t>So How do You Introduce TDD into an Organization or Team?, by Jeremy Miller</a:t>
+            </a:r>
+          </a:p>
+          <a:p>
+            <a:pPr lvl="1"/>
+            <a:r>
+              <a:rPr lang="en-US" sz="1800" b="1" dirty="0" smtClean="0">
+                <a:hlinkClick r:id="rId3"/>
+              </a:rPr>
+              <a:t>http://codebetter.com/blogs/jeremy.miller/archive/2006/06/27/146899.aspx</a:t>
+            </a:r>
+            <a:endParaRPr lang="en-US" sz="1800" b="1" dirty="0" smtClean="0"/>
+          </a:p>
+          <a:p>
+            <a:pPr lvl="1"/>
+            <a:endParaRPr lang="en-US" sz="1800" b="1" dirty="0" smtClean="0"/>
+          </a:p>
+          <a:p>
+            <a:r>
+              <a:rPr lang="en-US" sz="2400" dirty="0" smtClean="0"/>
+              <a:t>How to get started with TDD, by </a:t>
             </a:r>
             <a:r>
               <a:rPr lang="en-US" sz="2400" dirty="0" err="1" smtClean="0"/>
-              <a:t>Nbehave</a:t>
+              <a:t>Misko</a:t>
+            </a:r>
+            <a:r>
+              <a:rPr lang="en-US" sz="2400" dirty="0" smtClean="0"/>
+              <a:t> </a:t>
+            </a:r>
+            <a:r>
+              <a:rPr lang="en-US" sz="2400" dirty="0" err="1" smtClean="0"/>
+              <a:t>Hevery</a:t>
+            </a:r>
+            <a:r>
+              <a:rPr lang="en-US" sz="2400" dirty="0" smtClean="0"/>
+              <a:t> (Java examples)</a:t>
+            </a:r>
+          </a:p>
+          <a:p>
+            <a:pPr lvl="1"/>
+            <a:r>
+              <a:rPr lang="en-US" sz="1800" b="1" dirty="0" smtClean="0">
+                <a:hlinkClick r:id="rId4"/>
+              </a:rPr>
+              <a:t>http://misko.hevery.com/2009/11/17/how-to-get-started-with-tdd/</a:t>
             </a:r>
             <a:endParaRPr lang="en-US" sz="2400" dirty="0" smtClean="0"/>
           </a:p>
           <a:p>
+            <a:pPr lvl="1"/>
+            <a:endParaRPr lang="en-US" sz="2400" dirty="0" smtClean="0"/>
+          </a:p>
+          <a:p>
             <a:r>
               <a:rPr lang="en-US" sz="2400" dirty="0" smtClean="0"/>
-              <a:t>Rhino Mocks</a:t>
-            </a:r>
-          </a:p>
-          <a:p>
+              <a:t>TDD Starter Kit – Sample Projects and Links (C# examples)</a:t>
+            </a:r>
+          </a:p>
+          <a:p>
+            <a:pPr lvl="1"/>
+            <a:r>
+              <a:rPr lang="en-US" sz="1800" dirty="0" smtClean="0">
+                <a:hlinkClick r:id="rId5"/>
+              </a:rPr>
+              <a:t>http://jonkruger.com/blog/2009/07/23/tdd-starter-kit-sample-projects-and-links/</a:t>
+            </a:r>
+            <a:endParaRPr lang="en-US" sz="1800" dirty="0" smtClean="0"/>
+          </a:p>
+          <a:p>
+            <a:pPr lvl="1"/>
+            <a:endParaRPr lang="en-US" sz="1800" dirty="0" smtClean="0"/>
+          </a:p>
+          <a:p>
+            <a:r>
+              <a:rPr lang="en-US" sz="2400" dirty="0" smtClean="0"/>
+              <a:t>Pair Programming </a:t>
+            </a:r>
+            <a:r>
+              <a:rPr lang="en-US" sz="2400" dirty="0" err="1" smtClean="0"/>
+              <a:t>Bot</a:t>
+            </a:r>
             <a:endParaRPr lang="en-US" sz="2400" dirty="0" smtClean="0"/>
           </a:p>
           <a:p>
-            <a:r>
-              <a:rPr lang="en-US" sz="2400" dirty="0" smtClean="0"/>
-              <a:t>Java?</a:t>
-            </a:r>
-          </a:p>
-          <a:p>
-            <a:endParaRPr lang="en-US" sz="2400" dirty="0" smtClean="0"/>
-          </a:p>
-          <a:p>
-            <a:r>
-              <a:rPr lang="en-US" sz="2400" dirty="0" err="1" smtClean="0"/>
-              <a:t>Rspec</a:t>
-            </a:r>
-            <a:r>
-              <a:rPr lang="en-US" sz="2400" smtClean="0"/>
-              <a:t>?</a:t>
-            </a:r>
+            <a:pPr lvl="1"/>
+            <a:r>
+              <a:rPr lang="en-US" sz="1800" dirty="0" smtClean="0">
+                <a:hlinkClick r:id="rId6"/>
+              </a:rPr>
+              <a:t>http://pairprogrammingbot.com/</a:t>
+            </a:r>
+            <a:endParaRPr lang="en-US" sz="1800" dirty="0" smtClean="0"/>
+          </a:p>
+          <a:p>
             <a:endParaRPr lang="en-US" dirty="0"/>
           </a:p>
         </p:txBody>
@@ -8258,7 +8421,7 @@
           <a:p>
             <a:r>
               <a:rPr lang="en-US" dirty="0" smtClean="0"/>
-              <a:t>Resources – Learning TDD</a:t>
+              <a:t>Resources – Books</a:t>
             </a:r>
             <a:endParaRPr lang="en-US" dirty="0"/>
           </a:p>
@@ -8282,128 +8445,94 @@
         </p:spPr>
         <p:txBody>
           <a:bodyPr>
-            <a:normAutofit lnSpcReduction="10000"/>
+            <a:normAutofit/>
           </a:bodyPr>
           <a:lstStyle/>
           <a:p>
             <a:r>
-              <a:rPr lang="en-US" sz="2400" dirty="0" smtClean="0"/>
-              <a:t>Behavior Driven Development</a:t>
+              <a:rPr lang="en-US" dirty="0" smtClean="0"/>
+              <a:t>The Art of Unit Testing</a:t>
             </a:r>
           </a:p>
           <a:p>
             <a:pPr lvl="1"/>
             <a:r>
-              <a:rPr lang="en-US" sz="1800" b="1" dirty="0" smtClean="0">
-                <a:hlinkClick r:id="rId2"/>
-              </a:rPr>
-              <a:t>http://www.code-magazine.com/article.aspx?quickid=0805061&amp;page=1</a:t>
-            </a:r>
-            <a:endParaRPr lang="en-US" sz="1800" b="1" dirty="0" smtClean="0"/>
+              <a:rPr lang="en-US" dirty="0" smtClean="0"/>
+              <a:t>by Roy </a:t>
+            </a:r>
+            <a:r>
+              <a:rPr lang="en-US" dirty="0" err="1" smtClean="0"/>
+              <a:t>Osherove</a:t>
+            </a:r>
+            <a:endParaRPr lang="en-US" dirty="0" smtClean="0"/>
+          </a:p>
+          <a:p>
+            <a:r>
+              <a:rPr lang="en-US" dirty="0" smtClean="0"/>
+              <a:t>Test Driven Development: By Example</a:t>
+            </a:r>
           </a:p>
           <a:p>
             <a:pPr lvl="1"/>
-            <a:endParaRPr lang="en-US" sz="1800" b="1" dirty="0" smtClean="0"/>
-          </a:p>
-          <a:p>
-            <a:r>
-              <a:rPr lang="en-US" sz="2400" dirty="0" smtClean="0"/>
-              <a:t>So How do You Introduce TDD into an Organization or Team?, by Jeremy Miller</a:t>
+            <a:r>
+              <a:rPr lang="en-US" dirty="0" smtClean="0"/>
+              <a:t>by Kent Beck</a:t>
+            </a:r>
+          </a:p>
+          <a:p>
+            <a:r>
+              <a:rPr lang="en-US" dirty="0" smtClean="0"/>
+              <a:t>Test Driven Development: A Practical Guide</a:t>
             </a:r>
           </a:p>
           <a:p>
             <a:pPr lvl="1"/>
             <a:r>
-              <a:rPr lang="en-US" sz="1800" b="1" dirty="0" smtClean="0">
-                <a:hlinkClick r:id="rId3"/>
-              </a:rPr>
-              <a:t>http://codebetter.com/blogs/jeremy.miller/archive/2006/06/27/146899.aspx</a:t>
-            </a:r>
-            <a:endParaRPr lang="en-US" sz="1800" b="1" dirty="0" smtClean="0"/>
+              <a:rPr lang="en-US" dirty="0" smtClean="0"/>
+              <a:t>by David </a:t>
+            </a:r>
+            <a:r>
+              <a:rPr lang="en-US" dirty="0" err="1" smtClean="0"/>
+              <a:t>Astels</a:t>
+            </a:r>
+            <a:endParaRPr lang="en-US" dirty="0" smtClean="0"/>
+          </a:p>
+          <a:p>
+            <a:r>
+              <a:rPr lang="en-US" dirty="0" smtClean="0"/>
+              <a:t>The RSpec Book: </a:t>
+            </a:r>
+            <a:r>
+              <a:rPr lang="en-US" dirty="0" err="1" smtClean="0"/>
+              <a:t>Behaviour</a:t>
+            </a:r>
+            <a:r>
+              <a:rPr lang="en-US" dirty="0" smtClean="0"/>
+              <a:t> Driven Development with RSpec, Cucumber, and Friends</a:t>
+            </a:r>
           </a:p>
           <a:p>
             <a:pPr lvl="1"/>
-            <a:endParaRPr lang="en-US" sz="1800" b="1" dirty="0" smtClean="0"/>
-          </a:p>
-          <a:p>
-            <a:r>
-              <a:rPr lang="en-US" sz="2400" dirty="0" smtClean="0"/>
-              <a:t>How to get started with TDD, by </a:t>
-            </a:r>
-            <a:r>
-              <a:rPr lang="en-US" sz="2400" dirty="0" err="1" smtClean="0"/>
-              <a:t>Misko</a:t>
-            </a:r>
-            <a:r>
-              <a:rPr lang="en-US" sz="2400" dirty="0" smtClean="0"/>
-              <a:t> </a:t>
-            </a:r>
-            <a:r>
-              <a:rPr lang="en-US" sz="2400" dirty="0" err="1" smtClean="0"/>
-              <a:t>Hevery</a:t>
-            </a:r>
-            <a:r>
-              <a:rPr lang="en-US" sz="2400" dirty="0" smtClean="0"/>
-              <a:t> (Java examples)</a:t>
-            </a:r>
-          </a:p>
-          <a:p>
-            <a:pPr lvl="1"/>
-            <a:r>
-              <a:rPr lang="en-US" sz="1800" b="1" dirty="0" smtClean="0">
-                <a:hlinkClick r:id="rId4"/>
-              </a:rPr>
-              <a:t>http://misko.hevery.com/2009/11/17/how-to-get-started-with-tdd/</a:t>
-            </a:r>
-            <a:endParaRPr lang="en-US" sz="2400" dirty="0" smtClean="0"/>
-          </a:p>
-          <a:p>
-            <a:pPr lvl="1"/>
-            <a:endParaRPr lang="en-US" sz="2400" dirty="0" smtClean="0"/>
-          </a:p>
-          <a:p>
-            <a:r>
-              <a:rPr lang="en-US" sz="2400" dirty="0" smtClean="0"/>
-              <a:t>TDD Starter Kit – Sample Projects and Links (C# examples)</a:t>
-            </a:r>
-          </a:p>
-          <a:p>
-            <a:pPr lvl="1"/>
-            <a:r>
-              <a:rPr lang="en-US" sz="1800" dirty="0" smtClean="0">
-                <a:hlinkClick r:id="rId5"/>
-              </a:rPr>
-              <a:t>http://jonkruger.com/blog/2009/07/23/tdd-starter-kit-sample-projects-and-links/</a:t>
-            </a:r>
-            <a:endParaRPr lang="en-US" sz="1800" dirty="0" smtClean="0"/>
-          </a:p>
-          <a:p>
-            <a:pPr lvl="1"/>
-            <a:endParaRPr lang="en-US" sz="1800" dirty="0" smtClean="0"/>
-          </a:p>
-          <a:p>
-            <a:r>
-              <a:rPr lang="en-US" sz="2400" dirty="0" smtClean="0"/>
-              <a:t>Pair Programming </a:t>
-            </a:r>
-            <a:r>
-              <a:rPr lang="en-US" sz="2400" dirty="0" err="1" smtClean="0"/>
-              <a:t>Bot</a:t>
-            </a:r>
-            <a:endParaRPr lang="en-US" sz="2400" dirty="0" smtClean="0"/>
-          </a:p>
-          <a:p>
-            <a:pPr lvl="1"/>
-            <a:r>
-              <a:rPr lang="en-US" sz="1800" dirty="0" smtClean="0">
-                <a:hlinkClick r:id="rId6"/>
-              </a:rPr>
-              <a:t>http://pairprogrammingbot.com/</a:t>
-            </a:r>
-            <a:endParaRPr lang="en-US" sz="1800" dirty="0" smtClean="0"/>
-          </a:p>
-          <a:p>
-            <a:endParaRPr lang="en-US" dirty="0"/>
+            <a:r>
+              <a:rPr lang="en-US" dirty="0" smtClean="0"/>
+              <a:t>by David </a:t>
+            </a:r>
+            <a:r>
+              <a:rPr lang="en-US" dirty="0" err="1" smtClean="0"/>
+              <a:t>Chelimsky</a:t>
+            </a:r>
+            <a:r>
+              <a:rPr lang="en-US" dirty="0" smtClean="0"/>
+              <a:t>, Dave </a:t>
+            </a:r>
+            <a:r>
+              <a:rPr lang="en-US" dirty="0" err="1" smtClean="0"/>
+              <a:t>Astels</a:t>
+            </a:r>
+            <a:r>
+              <a:rPr lang="en-US" dirty="0" smtClean="0"/>
+              <a:t>, et. al.</a:t>
+            </a:r>
           </a:p>
         </p:txBody>
       </p:sp>
@@ -8458,7 +8587,7 @@
           <a:p>
             <a:r>
               <a:rPr lang="en-US" dirty="0" smtClean="0"/>
-              <a:t>Resources – Books</a:t>
+              <a:t>Resources – Practice!</a:t>
             </a:r>
             <a:endParaRPr lang="en-US" dirty="0"/>
           </a:p>
@@ -8477,99 +8606,162 @@
         <p:spPr>
           <a:xfrm>
             <a:off x="457200" y="1600200"/>
-            <a:ext cx="8229600" cy="5105400"/>
+            <a:ext cx="8229600" cy="5257800"/>
           </a:xfrm>
         </p:spPr>
         <p:txBody>
           <a:bodyPr>
-            <a:normAutofit/>
+            <a:normAutofit lnSpcReduction="10000"/>
           </a:bodyPr>
           <a:lstStyle/>
           <a:p>
             <a:r>
               <a:rPr lang="en-US" dirty="0" smtClean="0"/>
-              <a:t>The Art of Unit Testing</a:t>
-            </a:r>
+              <a:t>String Calculator </a:t>
+            </a:r>
+            <a:r>
+              <a:rPr lang="en-US" dirty="0" err="1" smtClean="0"/>
+              <a:t>kata</a:t>
+            </a:r>
+            <a:endParaRPr lang="en-US" dirty="0" smtClean="0"/>
           </a:p>
           <a:p>
             <a:pPr lvl="1"/>
             <a:r>
+              <a:rPr lang="en-US" dirty="0" smtClean="0">
+                <a:hlinkClick r:id="rId2"/>
+              </a:rPr>
+              <a:t>http://osherove.com/tdd-kata-1/</a:t>
+            </a:r>
+            <a:endParaRPr lang="en-US" dirty="0" smtClean="0"/>
+          </a:p>
+          <a:p>
+            <a:pPr lvl="1"/>
+            <a:endParaRPr lang="en-US" dirty="0" smtClean="0"/>
+          </a:p>
+          <a:p>
+            <a:r>
               <a:rPr lang="en-US" dirty="0" smtClean="0"/>
-              <a:t>by Roy </a:t>
+              <a:t>Bowling Game </a:t>
             </a:r>
             <a:r>
               <a:rPr lang="en-US" dirty="0" err="1" smtClean="0"/>
-              <a:t>Osherove</a:t>
+              <a:t>kata</a:t>
             </a:r>
             <a:endParaRPr lang="en-US" dirty="0" smtClean="0"/>
           </a:p>
           <a:p>
-            <a:r>
-              <a:rPr lang="en-US" dirty="0" smtClean="0"/>
-              <a:t>Test Driven Development: By Example</a:t>
-            </a:r>
-          </a:p>
-          <a:p>
             <a:pPr lvl="1"/>
             <a:r>
-              <a:rPr lang="en-US" dirty="0" smtClean="0"/>
-              <a:t>by Kent Beck</a:t>
-            </a:r>
-          </a:p>
-          <a:p>
-            <a:r>
-              <a:rPr lang="en-US" dirty="0" smtClean="0"/>
-              <a:t>Test Driven Development: A Practical Guide</a:t>
-            </a:r>
+              <a:rPr lang="en-US" sz="2100" dirty="0" smtClean="0">
+                <a:hlinkClick r:id="rId3"/>
+              </a:rPr>
+              <a:t>http://butunclebob.com/ArticleS.UncleBob.TheBowlingGameKata</a:t>
+            </a:r>
+            <a:endParaRPr lang="en-US" sz="2100" dirty="0" smtClean="0"/>
           </a:p>
           <a:p>
             <a:pPr lvl="1"/>
-            <a:r>
-              <a:rPr lang="en-US" dirty="0" smtClean="0"/>
-              <a:t>by David </a:t>
-            </a:r>
-            <a:r>
-              <a:rPr lang="en-US" dirty="0" err="1" smtClean="0"/>
-              <a:t>Astels</a:t>
+            <a:endParaRPr lang="en-US" sz="2100" dirty="0" smtClean="0"/>
+          </a:p>
+          <a:p>
+            <a:r>
+              <a:rPr lang="en-US" sz="2700" dirty="0" smtClean="0"/>
+              <a:t>Prime Factors </a:t>
+            </a:r>
+            <a:r>
+              <a:rPr lang="en-US" sz="2700" dirty="0" err="1" smtClean="0"/>
+              <a:t>kata</a:t>
+            </a:r>
+            <a:endParaRPr lang="en-US" sz="2700" dirty="0" smtClean="0"/>
+          </a:p>
+          <a:p>
+            <a:pPr lvl="1"/>
+            <a:r>
+              <a:rPr lang="en-US" sz="1900" dirty="0" smtClean="0">
+                <a:hlinkClick r:id="rId4"/>
+              </a:rPr>
+              <a:t>http://www.butunclebob.com/ArticleS.UncleBob.ThePrimeFactorsKata</a:t>
+            </a:r>
+            <a:endParaRPr lang="en-US" sz="1900" dirty="0" smtClean="0"/>
+          </a:p>
+          <a:p>
+            <a:pPr lvl="1"/>
+            <a:endParaRPr lang="en-US" sz="1900" dirty="0" smtClean="0"/>
+          </a:p>
+          <a:p>
+            <a:r>
+              <a:rPr lang="en-US" sz="2500" dirty="0" smtClean="0"/>
+              <a:t>Greed game (part of the Ruby </a:t>
+            </a:r>
+            <a:r>
+              <a:rPr lang="en-US" sz="2500" dirty="0" err="1" smtClean="0"/>
+              <a:t>koans</a:t>
+            </a:r>
+            <a:r>
+              <a:rPr lang="en-US" sz="2500" dirty="0" smtClean="0"/>
+              <a:t>)</a:t>
+            </a:r>
+          </a:p>
+          <a:p>
+            <a:pPr lvl="1"/>
+            <a:r>
+              <a:rPr lang="en-US" dirty="0" smtClean="0">
+                <a:hlinkClick r:id="rId5"/>
+              </a:rPr>
+              <a:t>http://github.com/edgecase/ruby_koans</a:t>
             </a:r>
             <a:endParaRPr lang="en-US" dirty="0" smtClean="0"/>
           </a:p>
           <a:p>
-            <a:r>
-              <a:rPr lang="en-US" dirty="0" smtClean="0"/>
-              <a:t>The RSpec Book: </a:t>
-            </a:r>
-            <a:r>
-              <a:rPr lang="en-US" dirty="0" err="1" smtClean="0"/>
-              <a:t>Behaviour</a:t>
-            </a:r>
-            <a:r>
-              <a:rPr lang="en-US" dirty="0" smtClean="0"/>
-              <a:t> Driven Development with RSpec, Cucumber, and Friends</a:t>
-            </a:r>
-          </a:p>
-          <a:p>
             <a:pPr lvl="1"/>
-            <a:r>
-              <a:rPr lang="en-US" dirty="0" smtClean="0"/>
-              <a:t>by David </a:t>
-            </a:r>
-            <a:r>
-              <a:rPr lang="en-US" dirty="0" err="1" smtClean="0"/>
-              <a:t>Chelimsky</a:t>
-            </a:r>
-            <a:r>
-              <a:rPr lang="en-US" dirty="0" smtClean="0"/>
-              <a:t>, Dave </a:t>
-            </a:r>
-            <a:r>
-              <a:rPr lang="en-US" dirty="0" err="1" smtClean="0"/>
-              <a:t>Astels</a:t>
-            </a:r>
-            <a:r>
-              <a:rPr lang="en-US" dirty="0" smtClean="0"/>
-              <a:t>, et. al.</a:t>
-            </a:r>
+            <a:endParaRPr lang="en-US" sz="1900" dirty="0" smtClean="0"/>
+          </a:p>
+          <a:p>
+            <a:r>
+              <a:rPr lang="en-US" sz="2500" dirty="0" err="1" smtClean="0"/>
+              <a:t>Katacasts</a:t>
+            </a:r>
+            <a:r>
+              <a:rPr lang="en-US" sz="2500" dirty="0"/>
+              <a:t> </a:t>
+            </a:r>
+            <a:r>
+              <a:rPr lang="en-US" sz="2500" dirty="0" smtClean="0"/>
+              <a:t>(watch </a:t>
+            </a:r>
+            <a:r>
+              <a:rPr lang="en-US" sz="2500" dirty="0" err="1" smtClean="0"/>
+              <a:t>screencasts</a:t>
+            </a:r>
+            <a:r>
+              <a:rPr lang="en-US" sz="2500" dirty="0" smtClean="0"/>
+              <a:t> of people doing various </a:t>
+            </a:r>
+            <a:r>
+              <a:rPr lang="en-US" sz="2500" dirty="0" err="1" smtClean="0"/>
+              <a:t>katas</a:t>
+            </a:r>
+            <a:r>
+              <a:rPr lang="en-US" sz="2500" dirty="0" smtClean="0"/>
+              <a:t>)</a:t>
+            </a:r>
+          </a:p>
+          <a:p>
+            <a:pPr lvl="1"/>
+            <a:r>
+              <a:rPr lang="en-US" dirty="0" smtClean="0">
+                <a:hlinkClick r:id="rId6"/>
+              </a:rPr>
+              <a:t>http://www.katacasts.com/</a:t>
+            </a:r>
+            <a:endParaRPr lang="en-US" dirty="0" smtClean="0"/>
+          </a:p>
+          <a:p>
+            <a:pPr lvl="1">
+              <a:buNone/>
+            </a:pPr>
+            <a:endParaRPr lang="en-US" sz="1900" dirty="0" smtClean="0"/>
           </a:p>
         </p:txBody>
       </p:sp>
@@ -8624,7 +8816,7 @@
           <a:p>
             <a:r>
               <a:rPr lang="en-US" dirty="0" smtClean="0"/>
-              <a:t>Resources – Practice!</a:t>
+              <a:t>Resources – Training</a:t>
             </a:r>
             <a:endParaRPr lang="en-US" dirty="0"/>
           </a:p>
@@ -8643,162 +8835,115 @@
         <p:spPr>
           <a:xfrm>
             <a:off x="457200" y="1600200"/>
-            <a:ext cx="8229600" cy="5257800"/>
+            <a:ext cx="8229600" cy="4953000"/>
           </a:xfrm>
         </p:spPr>
         <p:txBody>
           <a:bodyPr>
-            <a:normAutofit lnSpcReduction="10000"/>
+            <a:normAutofit/>
           </a:bodyPr>
           <a:lstStyle/>
           <a:p>
             <a:r>
               <a:rPr lang="en-US" dirty="0" smtClean="0"/>
-              <a:t>String Calculator </a:t>
-            </a:r>
-            <a:r>
-              <a:rPr lang="en-US" dirty="0" err="1" smtClean="0"/>
-              <a:t>kata</a:t>
-            </a:r>
-            <a:endParaRPr lang="en-US" dirty="0" smtClean="0"/>
+              <a:t>TDD Boot Camp (.NET)</a:t>
+            </a:r>
           </a:p>
           <a:p>
             <a:pPr lvl="1"/>
             <a:r>
-              <a:rPr lang="en-US" dirty="0" smtClean="0">
+              <a:rPr lang="en-US" sz="2800" dirty="0" smtClean="0">
                 <a:hlinkClick r:id="rId2"/>
               </a:rPr>
-              <a:t>http://osherove.com/tdd-kata-1/</a:t>
-            </a:r>
-            <a:endParaRPr lang="en-US" dirty="0" smtClean="0"/>
+              <a:t>http://tddbootcamp.com</a:t>
+            </a:r>
+            <a:endParaRPr lang="en-US" sz="2800" dirty="0" smtClean="0"/>
           </a:p>
           <a:p>
             <a:pPr lvl="1"/>
-            <a:endParaRPr lang="en-US" dirty="0" smtClean="0"/>
+            <a:r>
+              <a:rPr lang="en-US" sz="2800" dirty="0" smtClean="0"/>
+              <a:t>Cincinnati – June 22-24</a:t>
+            </a:r>
+          </a:p>
+          <a:p>
+            <a:pPr lvl="1"/>
+            <a:r>
+              <a:rPr lang="en-US" sz="2800" dirty="0" smtClean="0"/>
+              <a:t>Columbus – July 13-15</a:t>
+            </a:r>
+          </a:p>
+          <a:p>
+            <a:pPr lvl="1"/>
+            <a:r>
+              <a:rPr lang="en-US" sz="2800" dirty="0" smtClean="0"/>
+              <a:t>Detroit – Aug. 18-20</a:t>
+            </a:r>
+            <a:br>
+              <a:rPr lang="en-US" sz="2800" dirty="0" smtClean="0"/>
+            </a:br>
+            <a:endParaRPr lang="en-US" sz="2800" dirty="0" smtClean="0"/>
           </a:p>
           <a:p>
             <a:r>
               <a:rPr lang="en-US" dirty="0" smtClean="0"/>
-              <a:t>Bowling Game </a:t>
-            </a:r>
-            <a:r>
-              <a:rPr lang="en-US" dirty="0" err="1" smtClean="0"/>
-              <a:t>kata</a:t>
-            </a:r>
-            <a:endParaRPr lang="en-US" dirty="0" smtClean="0"/>
+              <a:t>Pillar Technology (Java)</a:t>
+            </a:r>
           </a:p>
           <a:p>
             <a:pPr lvl="1"/>
             <a:r>
-              <a:rPr lang="en-US" sz="2100" dirty="0" smtClean="0">
+              <a:rPr lang="en-US" sz="2800" dirty="0" smtClean="0">
                 <a:hlinkClick r:id="rId3"/>
               </a:rPr>
-              <a:t>http://butunclebob.com/ArticleS.UncleBob.TheBowlingGameKata</a:t>
-            </a:r>
-            <a:endParaRPr lang="en-US" sz="2100" dirty="0" smtClean="0"/>
+              <a:t>http://pillartechnology.com</a:t>
+            </a:r>
+            <a:r>
+              <a:rPr lang="en-US" sz="2800" dirty="0" smtClean="0"/>
+              <a:t/>
+            </a:r>
+            <a:br>
+              <a:rPr lang="en-US" sz="2800" dirty="0" smtClean="0"/>
+            </a:br>
+            <a:endParaRPr lang="en-US" sz="2800" dirty="0" smtClean="0"/>
+          </a:p>
+          <a:p>
+            <a:r>
+              <a:rPr lang="en-US" dirty="0" err="1" smtClean="0"/>
+              <a:t>EdgeCase</a:t>
+            </a:r>
+            <a:r>
+              <a:rPr lang="en-US" dirty="0" smtClean="0"/>
+              <a:t> (Ruby on Rails)</a:t>
+            </a:r>
           </a:p>
           <a:p>
             <a:pPr lvl="1"/>
-            <a:endParaRPr lang="en-US" sz="2100" dirty="0" smtClean="0"/>
-          </a:p>
-          <a:p>
-            <a:r>
-              <a:rPr lang="en-US" sz="2700" dirty="0" smtClean="0"/>
-              <a:t>Prime Factors </a:t>
-            </a:r>
-            <a:r>
-              <a:rPr lang="en-US" sz="2700" dirty="0" err="1" smtClean="0"/>
-              <a:t>kata</a:t>
-            </a:r>
-            <a:endParaRPr lang="en-US" sz="2700" dirty="0" smtClean="0"/>
-          </a:p>
-          <a:p>
-            <a:pPr lvl="1"/>
-            <a:r>
-              <a:rPr lang="en-US" sz="1900" dirty="0" smtClean="0">
+            <a:r>
+              <a:rPr lang="en-US" sz="2800" dirty="0" smtClean="0">
                 <a:hlinkClick r:id="rId4"/>
               </a:rPr>
-              <a:t>http://www.butunclebob.com/ArticleS.UncleBob.ThePrimeFactorsKata</a:t>
-            </a:r>
-            <a:endParaRPr lang="en-US" sz="1900" dirty="0" smtClean="0"/>
-          </a:p>
-          <a:p>
-            <a:pPr lvl="1"/>
-            <a:endParaRPr lang="en-US" sz="1900" dirty="0" smtClean="0"/>
-          </a:p>
-          <a:p>
-            <a:r>
-              <a:rPr lang="en-US" sz="2500" dirty="0" smtClean="0"/>
-              <a:t>Greed game (part of the Ruby </a:t>
-            </a:r>
-            <a:r>
-              <a:rPr lang="en-US" sz="2500" dirty="0" err="1" smtClean="0"/>
-              <a:t>koans</a:t>
-            </a:r>
-            <a:r>
-              <a:rPr lang="en-US" sz="2500" dirty="0" smtClean="0"/>
-              <a:t>)</a:t>
-            </a:r>
-          </a:p>
-          <a:p>
-            <a:pPr lvl="1"/>
-            <a:r>
-              <a:rPr lang="en-US" dirty="0" smtClean="0">
-                <a:hlinkClick r:id="rId5"/>
-              </a:rPr>
-              <a:t>http://github.com/edgecase/ruby_koans</a:t>
-            </a:r>
-            <a:endParaRPr lang="en-US" dirty="0" smtClean="0"/>
-          </a:p>
-          <a:p>
-            <a:pPr lvl="1"/>
-            <a:endParaRPr lang="en-US" sz="1900" dirty="0" smtClean="0"/>
-          </a:p>
-          <a:p>
-            <a:r>
-              <a:rPr lang="en-US" sz="2500" dirty="0" err="1" smtClean="0"/>
-              <a:t>Katacasts</a:t>
-            </a:r>
-            <a:r>
-              <a:rPr lang="en-US" sz="2500" dirty="0"/>
-              <a:t> </a:t>
-            </a:r>
-            <a:r>
-              <a:rPr lang="en-US" sz="2500" dirty="0" smtClean="0"/>
-              <a:t>(watch </a:t>
-            </a:r>
-            <a:r>
-              <a:rPr lang="en-US" sz="2500" dirty="0" err="1" smtClean="0"/>
-              <a:t>screencasts</a:t>
-            </a:r>
-            <a:r>
-              <a:rPr lang="en-US" sz="2500" dirty="0" smtClean="0"/>
-              <a:t> of people doing various </a:t>
-            </a:r>
-            <a:r>
-              <a:rPr lang="en-US" sz="2500" dirty="0" err="1" smtClean="0"/>
-              <a:t>katas</a:t>
-            </a:r>
-            <a:r>
-              <a:rPr lang="en-US" sz="2500" dirty="0" smtClean="0"/>
-              <a:t>)</a:t>
-            </a:r>
-          </a:p>
-          <a:p>
-            <a:pPr lvl="1"/>
-            <a:r>
-              <a:rPr lang="en-US" dirty="0" smtClean="0">
-                <a:hlinkClick r:id="rId6"/>
-              </a:rPr>
-              <a:t>http://www.katacasts.com/</a:t>
-            </a:r>
-            <a:endParaRPr lang="en-US" dirty="0" smtClean="0"/>
+              <a:t>http://edgecase.com</a:t>
+            </a:r>
+            <a:endParaRPr lang="en-US" sz="2800" dirty="0" smtClean="0"/>
           </a:p>
           <a:p>
             <a:pPr lvl="1">
               <a:buNone/>
             </a:pPr>
-            <a:endParaRPr lang="en-US" sz="1900" dirty="0" smtClean="0"/>
+            <a:endParaRPr lang="en-US" sz="2800" dirty="0" smtClean="0"/>
+          </a:p>
+          <a:p>
+            <a:pPr lvl="1">
+              <a:buNone/>
+            </a:pPr>
+            <a:endParaRPr lang="en-US" sz="2800" dirty="0" smtClean="0"/>
+          </a:p>
+          <a:p>
+            <a:pPr lvl="1">
+              <a:buNone/>
+            </a:pPr>
+            <a:endParaRPr lang="en-US" sz="2800" dirty="0" smtClean="0"/>
           </a:p>
         </p:txBody>
       </p:sp>
@@ -8818,188 +8963,6 @@
 </file>
 
 <file path=ppt/slides/slide35.xml><?xml version="1.0" encoding="utf-8"?>
-<p:sld xmlns:a="http://schemas.openxmlformats.org/drawingml/2006/main" xmlns:r="http://schemas.openxmlformats.org/officeDocument/2006/relationships" xmlns:p="http://schemas.openxmlformats.org/presentationml/2006/main">
-  <p:cSld>
-    <p:spTree>
-      <p:nvGrpSpPr>
-        <p:cNvPr id="1" name=""/>
-        <p:cNvGrpSpPr/>
-        <p:nvPr/>
-      </p:nvGrpSpPr>
-      <p:grpSpPr>
-        <a:xfrm>
-          <a:off x="0" y="0"/>
-          <a:ext cx="0" cy="0"/>
-          <a:chOff x="0" y="0"/>
-          <a:chExt cx="0" cy="0"/>
-        </a:xfrm>
-      </p:grpSpPr>
-      <p:sp>
-        <p:nvSpPr>
-          <p:cNvPr id="2" name="Title 1"/>
-          <p:cNvSpPr>
-            <a:spLocks noGrp="1"/>
-          </p:cNvSpPr>
-          <p:nvPr>
-            <p:ph type="title"/>
-          </p:nvPr>
-        </p:nvSpPr>
-        <p:spPr/>
-        <p:txBody>
-          <a:bodyPr>
-            <a:normAutofit/>
-          </a:bodyPr>
-          <a:lstStyle/>
-          <a:p>
-            <a:r>
-              <a:rPr lang="en-US" dirty="0" smtClean="0"/>
-              <a:t>Resources – Training</a:t>
-            </a:r>
-            <a:endParaRPr lang="en-US" dirty="0"/>
-          </a:p>
-        </p:txBody>
-      </p:sp>
-      <p:sp>
-        <p:nvSpPr>
-          <p:cNvPr id="3" name="Content Placeholder 2"/>
-          <p:cNvSpPr>
-            <a:spLocks noGrp="1"/>
-          </p:cNvSpPr>
-          <p:nvPr>
-            <p:ph idx="1"/>
-          </p:nvPr>
-        </p:nvSpPr>
-        <p:spPr>
-          <a:xfrm>
-            <a:off x="457200" y="1600200"/>
-            <a:ext cx="8229600" cy="4953000"/>
-          </a:xfrm>
-        </p:spPr>
-        <p:txBody>
-          <a:bodyPr>
-            <a:normAutofit/>
-          </a:bodyPr>
-          <a:lstStyle/>
-          <a:p>
-            <a:r>
-              <a:rPr lang="en-US" dirty="0" smtClean="0"/>
-              <a:t>TDD Boot Camp (.NET)</a:t>
-            </a:r>
-          </a:p>
-          <a:p>
-            <a:pPr lvl="1"/>
-            <a:r>
-              <a:rPr lang="en-US" sz="2800" dirty="0" smtClean="0">
-                <a:hlinkClick r:id="rId2"/>
-              </a:rPr>
-              <a:t>http://tddbootcamp.com</a:t>
-            </a:r>
-            <a:endParaRPr lang="en-US" sz="2800" dirty="0" smtClean="0"/>
-          </a:p>
-          <a:p>
-            <a:pPr lvl="1"/>
-            <a:r>
-              <a:rPr lang="en-US" sz="2800" dirty="0" smtClean="0"/>
-              <a:t>Cincinnati – June 22-24</a:t>
-            </a:r>
-          </a:p>
-          <a:p>
-            <a:pPr lvl="1"/>
-            <a:r>
-              <a:rPr lang="en-US" sz="2800" dirty="0" smtClean="0"/>
-              <a:t>Columbus – July 13-15</a:t>
-            </a:r>
-          </a:p>
-          <a:p>
-            <a:pPr lvl="1"/>
-            <a:r>
-              <a:rPr lang="en-US" sz="2800" dirty="0" smtClean="0"/>
-              <a:t>Detroit – Aug. 18-20</a:t>
-            </a:r>
-            <a:br>
-              <a:rPr lang="en-US" sz="2800" dirty="0" smtClean="0"/>
-            </a:br>
-            <a:endParaRPr lang="en-US" sz="2800" dirty="0" smtClean="0"/>
-          </a:p>
-          <a:p>
-            <a:r>
-              <a:rPr lang="en-US" dirty="0" smtClean="0"/>
-              <a:t>Pillar Technology (Java)</a:t>
-            </a:r>
-          </a:p>
-          <a:p>
-            <a:pPr lvl="1"/>
-            <a:r>
-              <a:rPr lang="en-US" sz="2800" dirty="0" smtClean="0">
-                <a:hlinkClick r:id="rId3"/>
-              </a:rPr>
-              <a:t>http://pillartechnology.com</a:t>
-            </a:r>
-            <a:r>
-              <a:rPr lang="en-US" sz="2800" dirty="0" smtClean="0"/>
-              <a:t/>
-            </a:r>
-            <a:br>
-              <a:rPr lang="en-US" sz="2800" dirty="0" smtClean="0"/>
-            </a:br>
-            <a:endParaRPr lang="en-US" sz="2800" dirty="0" smtClean="0"/>
-          </a:p>
-          <a:p>
-            <a:r>
-              <a:rPr lang="en-US" dirty="0" err="1" smtClean="0"/>
-              <a:t>EdgeCase</a:t>
-            </a:r>
-            <a:r>
-              <a:rPr lang="en-US" dirty="0" smtClean="0"/>
-              <a:t> (Ruby on Rails)</a:t>
-            </a:r>
-          </a:p>
-          <a:p>
-            <a:pPr lvl="1"/>
-            <a:r>
-              <a:rPr lang="en-US" sz="2800" dirty="0" smtClean="0">
-                <a:hlinkClick r:id="rId4"/>
-              </a:rPr>
-              <a:t>http://edgecase.com</a:t>
-            </a:r>
-            <a:endParaRPr lang="en-US" sz="2800" dirty="0" smtClean="0"/>
-          </a:p>
-          <a:p>
-            <a:pPr lvl="1">
-              <a:buNone/>
-            </a:pPr>
-            <a:endParaRPr lang="en-US" sz="2800" dirty="0" smtClean="0"/>
-          </a:p>
-          <a:p>
-            <a:pPr lvl="1">
-              <a:buNone/>
-            </a:pPr>
-            <a:endParaRPr lang="en-US" sz="2800" dirty="0" smtClean="0"/>
-          </a:p>
-          <a:p>
-            <a:pPr lvl="1">
-              <a:buNone/>
-            </a:pPr>
-            <a:endParaRPr lang="en-US" sz="2800" dirty="0" smtClean="0"/>
-          </a:p>
-        </p:txBody>
-      </p:sp>
-    </p:spTree>
-  </p:cSld>
-  <p:clrMapOvr>
-    <a:masterClrMapping/>
-  </p:clrMapOvr>
-  <p:timing>
-    <p:tnLst>
-      <p:par>
-        <p:cTn id="1" dur="indefinite" restart="never" nodeType="tmRoot"/>
-      </p:par>
-    </p:tnLst>
-  </p:timing>
-</p:sld>
-</file>
-
-<file path=ppt/slides/slide36.xml><?xml version="1.0" encoding="utf-8"?>
 <p:sld xmlns:a="http://schemas.openxmlformats.org/drawingml/2006/main" xmlns:r="http://schemas.openxmlformats.org/officeDocument/2006/relationships" xmlns:p="http://schemas.openxmlformats.org/presentationml/2006/main">
   <p:cSld>
     <p:spTree>
@@ -11096,7 +11059,7 @@
             </a:pPr>
             <a:r>
               <a:rPr lang="en-US" sz="4400" b="1" dirty="0" smtClean="0"/>
-              <a:t>We incrementally translated the requirements </a:t>
+              <a:t>We know that our code is working!</a:t>
             </a:r>
             <a:endParaRPr lang="en-US" sz="4400" b="1" dirty="0"/>
           </a:p>

</xml_diff>

<commit_message>
added java test framework info
</commit_message>
<xml_diff>
--- a/TDD In Action.pptx
+++ b/TDD In Action.pptx
@@ -8116,27 +8116,50 @@
           <a:p>
             <a:pPr lvl="1"/>
             <a:r>
+              <a:rPr lang="en-US" sz="2400" dirty="0" err="1" smtClean="0"/>
+              <a:t>JUnit</a:t>
+            </a:r>
+            <a:r>
               <a:rPr lang="en-US" sz="2400" dirty="0" smtClean="0"/>
-              <a:t>???????????????</a:t>
-            </a:r>
-          </a:p>
-          <a:p>
-            <a:r>
-              <a:rPr lang="en-US" sz="2400" dirty="0" smtClean="0"/>
-              <a:t>Ruby</a:t>
-            </a:r>
-            <a:endParaRPr lang="en-US" sz="2400" dirty="0" smtClean="0"/>
-          </a:p>
-          <a:p>
-            <a:pPr lvl="1"/>
-            <a:r>
-              <a:rPr lang="en-US" sz="2400" dirty="0" smtClean="0"/>
-              <a:t>RSpec – </a:t>
+              <a:t> – </a:t>
             </a:r>
             <a:r>
               <a:rPr lang="en-US" sz="2400" dirty="0" smtClean="0">
                 <a:hlinkClick r:id="rId4"/>
               </a:rPr>
+              <a:t>http://junit.org</a:t>
+            </a:r>
+            <a:endParaRPr lang="en-US" sz="2400" dirty="0" smtClean="0"/>
+          </a:p>
+          <a:p>
+            <a:pPr lvl="1"/>
+            <a:r>
+              <a:rPr lang="en-US" sz="2400" dirty="0" err="1" smtClean="0"/>
+              <a:t>TestNG</a:t>
+            </a:r>
+            <a:r>
+              <a:rPr lang="en-US" sz="2400" smtClean="0"/>
+              <a:t> – http://testng.org</a:t>
+            </a:r>
+            <a:endParaRPr lang="en-US" sz="2400" dirty="0" smtClean="0"/>
+          </a:p>
+          <a:p>
+            <a:r>
+              <a:rPr lang="en-US" sz="2400" dirty="0" smtClean="0"/>
+              <a:t>Ruby</a:t>
+            </a:r>
+            <a:endParaRPr lang="en-US" sz="2400" dirty="0" smtClean="0"/>
+          </a:p>
+          <a:p>
+            <a:pPr lvl="1"/>
+            <a:r>
+              <a:rPr lang="en-US" sz="2400" dirty="0" smtClean="0"/>
+              <a:t>RSpec – </a:t>
+            </a:r>
+            <a:r>
+              <a:rPr lang="en-US" sz="2400" dirty="0" smtClean="0">
+                <a:hlinkClick r:id="rId5"/>
+              </a:rPr>
               <a:t>http://rspec.info</a:t>
             </a:r>
             <a:r>
@@ -8156,7 +8179,7 @@
             </a:r>
             <a:r>
               <a:rPr lang="en-US" sz="2400" dirty="0" smtClean="0">
-                <a:hlinkClick r:id="rId5"/>
+                <a:hlinkClick r:id="rId6"/>
               </a:rPr>
               <a:t>http://github.com/jonkruger/specs2tests</a:t>
             </a:r>
@@ -9354,8 +9377,13 @@
             </a:r>
             <a:r>
               <a:rPr lang="en-US" sz="2800" dirty="0" smtClean="0"/>
-              <a:t>……</a:t>
-            </a:r>
+              <a:t>, </a:t>
+            </a:r>
+            <a:r>
+              <a:rPr lang="en-US" sz="2800" dirty="0" err="1" smtClean="0"/>
+              <a:t>TestNG</a:t>
+            </a:r>
+            <a:endParaRPr lang="en-US" sz="2800" dirty="0" smtClean="0"/>
           </a:p>
           <a:p>
             <a:r>

</xml_diff>